<commit_message>
to be updated (backpropagation, loss function, minist)
</commit_message>
<xml_diff>
--- a/01. MLP & FFNN/MLP_FFNN_김병조.pptx
+++ b/01. MLP & FFNN/MLP_FFNN_김병조.pptx
@@ -7,35 +7,40 @@
   <p:sldIdLst>
     <p:sldId id="258" r:id="rId2"/>
     <p:sldId id="257" r:id="rId3"/>
-    <p:sldId id="280" r:id="rId4"/>
-    <p:sldId id="262" r:id="rId5"/>
-    <p:sldId id="271" r:id="rId6"/>
-    <p:sldId id="277" r:id="rId7"/>
-    <p:sldId id="278" r:id="rId8"/>
-    <p:sldId id="272" r:id="rId9"/>
-    <p:sldId id="273" r:id="rId10"/>
-    <p:sldId id="275" r:id="rId11"/>
-    <p:sldId id="260" r:id="rId12"/>
-    <p:sldId id="261" r:id="rId13"/>
-    <p:sldId id="263" r:id="rId14"/>
-    <p:sldId id="265" r:id="rId15"/>
-    <p:sldId id="281" r:id="rId16"/>
-    <p:sldId id="284" r:id="rId17"/>
-    <p:sldId id="285" r:id="rId18"/>
-    <p:sldId id="286" r:id="rId19"/>
-    <p:sldId id="276" r:id="rId20"/>
-    <p:sldId id="288" r:id="rId21"/>
-    <p:sldId id="291" r:id="rId22"/>
-    <p:sldId id="289" r:id="rId23"/>
-    <p:sldId id="292" r:id="rId24"/>
-    <p:sldId id="293" r:id="rId25"/>
-    <p:sldId id="294" r:id="rId26"/>
-    <p:sldId id="290" r:id="rId27"/>
-    <p:sldId id="270" r:id="rId28"/>
-    <p:sldId id="283" r:id="rId29"/>
-    <p:sldId id="267" r:id="rId30"/>
-    <p:sldId id="268" r:id="rId31"/>
-    <p:sldId id="269" r:id="rId32"/>
+    <p:sldId id="262" r:id="rId4"/>
+    <p:sldId id="271" r:id="rId5"/>
+    <p:sldId id="277" r:id="rId6"/>
+    <p:sldId id="278" r:id="rId7"/>
+    <p:sldId id="272" r:id="rId8"/>
+    <p:sldId id="273" r:id="rId9"/>
+    <p:sldId id="275" r:id="rId10"/>
+    <p:sldId id="260" r:id="rId11"/>
+    <p:sldId id="261" r:id="rId12"/>
+    <p:sldId id="263" r:id="rId13"/>
+    <p:sldId id="265" r:id="rId14"/>
+    <p:sldId id="281" r:id="rId15"/>
+    <p:sldId id="284" r:id="rId16"/>
+    <p:sldId id="285" r:id="rId17"/>
+    <p:sldId id="286" r:id="rId18"/>
+    <p:sldId id="295" r:id="rId19"/>
+    <p:sldId id="296" r:id="rId20"/>
+    <p:sldId id="276" r:id="rId21"/>
+    <p:sldId id="288" r:id="rId22"/>
+    <p:sldId id="291" r:id="rId23"/>
+    <p:sldId id="289" r:id="rId24"/>
+    <p:sldId id="292" r:id="rId25"/>
+    <p:sldId id="293" r:id="rId26"/>
+    <p:sldId id="294" r:id="rId27"/>
+    <p:sldId id="290" r:id="rId28"/>
+    <p:sldId id="302" r:id="rId29"/>
+    <p:sldId id="283" r:id="rId30"/>
+    <p:sldId id="298" r:id="rId31"/>
+    <p:sldId id="299" r:id="rId32"/>
+    <p:sldId id="300" r:id="rId33"/>
+    <p:sldId id="301" r:id="rId34"/>
+    <p:sldId id="267" r:id="rId35"/>
+    <p:sldId id="268" r:id="rId36"/>
+    <p:sldId id="269" r:id="rId37"/>
   </p:sldIdLst>
   <p:sldSz cx="12192000" cy="6858000"/>
   <p:notesSz cx="6858000" cy="9144000"/>
@@ -372,7 +377,7 @@
           <a:p>
             <a:fld id="{FB723FC9-7FB9-4C4F-8EDC-230AEC88725B}" type="datetimeFigureOut">
               <a:rPr kumimoji="1" lang="ko-KR" altLang="en-US" smtClean="0"/>
-              <a:t>2017-10-30</a:t>
+              <a:t>2017-11-02</a:t>
             </a:fld>
             <a:endParaRPr kumimoji="1" lang="ko-KR" altLang="en-US"/>
           </a:p>
@@ -580,7 +585,7 @@
           <a:p>
             <a:fld id="{FB723FC9-7FB9-4C4F-8EDC-230AEC88725B}" type="datetimeFigureOut">
               <a:rPr kumimoji="1" lang="ko-KR" altLang="en-US" smtClean="0"/>
-              <a:t>2017-10-30</a:t>
+              <a:t>2017-11-02</a:t>
             </a:fld>
             <a:endParaRPr kumimoji="1" lang="ko-KR" altLang="en-US"/>
           </a:p>
@@ -836,7 +841,7 @@
           <a:p>
             <a:fld id="{FB723FC9-7FB9-4C4F-8EDC-230AEC88725B}" type="datetimeFigureOut">
               <a:rPr kumimoji="1" lang="ko-KR" altLang="en-US" smtClean="0"/>
-              <a:t>2017-10-30</a:t>
+              <a:t>2017-11-02</a:t>
             </a:fld>
             <a:endParaRPr kumimoji="1" lang="ko-KR" altLang="en-US"/>
           </a:p>
@@ -1010,7 +1015,7 @@
           <a:p>
             <a:fld id="{FB723FC9-7FB9-4C4F-8EDC-230AEC88725B}" type="datetimeFigureOut">
               <a:rPr kumimoji="1" lang="ko-KR" altLang="en-US" smtClean="0"/>
-              <a:t>2017-10-30</a:t>
+              <a:t>2017-11-02</a:t>
             </a:fld>
             <a:endParaRPr kumimoji="1" lang="ko-KR" altLang="en-US"/>
           </a:p>
@@ -1353,7 +1358,7 @@
           <a:p>
             <a:fld id="{FB723FC9-7FB9-4C4F-8EDC-230AEC88725B}" type="datetimeFigureOut">
               <a:rPr kumimoji="1" lang="ko-KR" altLang="en-US" smtClean="0"/>
-              <a:t>2017-10-30</a:t>
+              <a:t>2017-11-02</a:t>
             </a:fld>
             <a:endParaRPr kumimoji="1" lang="ko-KR" altLang="en-US"/>
           </a:p>
@@ -1628,7 +1633,7 @@
           <a:p>
             <a:fld id="{FB723FC9-7FB9-4C4F-8EDC-230AEC88725B}" type="datetimeFigureOut">
               <a:rPr kumimoji="1" lang="ko-KR" altLang="en-US" smtClean="0"/>
-              <a:t>2017-10-30</a:t>
+              <a:t>2017-11-02</a:t>
             </a:fld>
             <a:endParaRPr kumimoji="1" lang="ko-KR" altLang="en-US"/>
           </a:p>
@@ -2007,7 +2012,7 @@
           <a:p>
             <a:fld id="{FB723FC9-7FB9-4C4F-8EDC-230AEC88725B}" type="datetimeFigureOut">
               <a:rPr kumimoji="1" lang="ko-KR" altLang="en-US" smtClean="0"/>
-              <a:t>2017-10-30</a:t>
+              <a:t>2017-11-02</a:t>
             </a:fld>
             <a:endParaRPr kumimoji="1" lang="ko-KR" altLang="en-US"/>
           </a:p>
@@ -2125,7 +2130,7 @@
           <a:p>
             <a:fld id="{FB723FC9-7FB9-4C4F-8EDC-230AEC88725B}" type="datetimeFigureOut">
               <a:rPr kumimoji="1" lang="ko-KR" altLang="en-US" smtClean="0"/>
-              <a:t>2017-10-30</a:t>
+              <a:t>2017-11-02</a:t>
             </a:fld>
             <a:endParaRPr kumimoji="1" lang="ko-KR" altLang="en-US"/>
           </a:p>
@@ -2296,7 +2301,7 @@
           <a:p>
             <a:fld id="{FB723FC9-7FB9-4C4F-8EDC-230AEC88725B}" type="datetimeFigureOut">
               <a:rPr kumimoji="1" lang="ko-KR" altLang="en-US" smtClean="0"/>
-              <a:t>2017-10-30</a:t>
+              <a:t>2017-11-02</a:t>
             </a:fld>
             <a:endParaRPr kumimoji="1" lang="ko-KR" altLang="en-US"/>
           </a:p>
@@ -2650,7 +2655,7 @@
           <a:p>
             <a:fld id="{FB723FC9-7FB9-4C4F-8EDC-230AEC88725B}" type="datetimeFigureOut">
               <a:rPr kumimoji="1" lang="ko-KR" altLang="en-US" smtClean="0"/>
-              <a:t>2017-10-30</a:t>
+              <a:t>2017-11-02</a:t>
             </a:fld>
             <a:endParaRPr kumimoji="1" lang="ko-KR" altLang="en-US"/>
           </a:p>
@@ -3032,7 +3037,7 @@
           <a:p>
             <a:fld id="{FB723FC9-7FB9-4C4F-8EDC-230AEC88725B}" type="datetimeFigureOut">
               <a:rPr kumimoji="1" lang="ko-KR" altLang="en-US" smtClean="0"/>
-              <a:t>2017-10-30</a:t>
+              <a:t>2017-11-02</a:t>
             </a:fld>
             <a:endParaRPr kumimoji="1" lang="ko-KR" altLang="en-US"/>
           </a:p>
@@ -3319,7 +3324,7 @@
           <a:p>
             <a:fld id="{FB723FC9-7FB9-4C4F-8EDC-230AEC88725B}" type="datetimeFigureOut">
               <a:rPr kumimoji="1" lang="ko-KR" altLang="en-US" smtClean="0"/>
-              <a:t>2017-10-30</a:t>
+              <a:t>2017-11-02</a:t>
             </a:fld>
             <a:endParaRPr kumimoji="1" lang="ko-KR" altLang="en-US"/>
           </a:p>
@@ -3908,92 +3913,6 @@
 </file>
 
 <file path=ppt/slides/slide10.xml><?xml version="1.0" encoding="utf-8"?>
-<p:sld xmlns:a="http://schemas.openxmlformats.org/drawingml/2006/main" xmlns:r="http://schemas.openxmlformats.org/officeDocument/2006/relationships" xmlns:p="http://schemas.openxmlformats.org/presentationml/2006/main">
-  <p:cSld>
-    <p:spTree>
-      <p:nvGrpSpPr>
-        <p:cNvPr id="1" name=""/>
-        <p:cNvGrpSpPr/>
-        <p:nvPr/>
-      </p:nvGrpSpPr>
-      <p:grpSpPr>
-        <a:xfrm>
-          <a:off x="0" y="0"/>
-          <a:ext cx="0" cy="0"/>
-          <a:chOff x="0" y="0"/>
-          <a:chExt cx="0" cy="0"/>
-        </a:xfrm>
-      </p:grpSpPr>
-      <p:sp>
-        <p:nvSpPr>
-          <p:cNvPr id="2" name="제목 1">
-            <a:extLst>
-              <a:ext uri="{FF2B5EF4-FFF2-40B4-BE49-F238E27FC236}">
-                <a16:creationId xmlns:a16="http://schemas.microsoft.com/office/drawing/2014/main" id="{6EDBD7DB-532B-469C-A0E8-976836A1917D}"/>
-              </a:ext>
-            </a:extLst>
-          </p:cNvPr>
-          <p:cNvSpPr>
-            <a:spLocks noGrp="1"/>
-          </p:cNvSpPr>
-          <p:nvPr>
-            <p:ph type="title"/>
-          </p:nvPr>
-        </p:nvSpPr>
-        <p:spPr/>
-        <p:txBody>
-          <a:bodyPr/>
-          <a:lstStyle/>
-          <a:p>
-            <a:r>
-              <a:rPr lang="ko-KR" altLang="en-US" dirty="0"/>
-              <a:t>결과</a:t>
-            </a:r>
-          </a:p>
-        </p:txBody>
-      </p:sp>
-      <p:sp>
-        <p:nvSpPr>
-          <p:cNvPr id="3" name="내용 개체 틀 2">
-            <a:extLst>
-              <a:ext uri="{FF2B5EF4-FFF2-40B4-BE49-F238E27FC236}">
-                <a16:creationId xmlns:a16="http://schemas.microsoft.com/office/drawing/2014/main" id="{8923F8D0-CFE9-4B9E-B512-49DBA9D38FF0}"/>
-              </a:ext>
-            </a:extLst>
-          </p:cNvPr>
-          <p:cNvSpPr>
-            <a:spLocks noGrp="1"/>
-          </p:cNvSpPr>
-          <p:nvPr>
-            <p:ph idx="1"/>
-          </p:nvPr>
-        </p:nvSpPr>
-        <p:spPr/>
-        <p:txBody>
-          <a:bodyPr/>
-          <a:lstStyle/>
-          <a:p>
-            <a:r>
-              <a:rPr lang="ko-KR" altLang="en-US" dirty="0"/>
-              <a:t>시연</a:t>
-            </a:r>
-          </a:p>
-        </p:txBody>
-      </p:sp>
-    </p:spTree>
-    <p:extLst>
-      <p:ext uri="{BB962C8B-B14F-4D97-AF65-F5344CB8AC3E}">
-        <p14:creationId xmlns:p14="http://schemas.microsoft.com/office/powerpoint/2010/main" val="3178876926"/>
-      </p:ext>
-    </p:extLst>
-  </p:cSld>
-  <p:clrMapOvr>
-    <a:masterClrMapping/>
-  </p:clrMapOvr>
-</p:sld>
-</file>
-
-<file path=ppt/slides/slide11.xml><?xml version="1.0" encoding="utf-8"?>
 <p:sld xmlns:a="http://schemas.openxmlformats.org/drawingml/2006/main" xmlns:r="http://schemas.openxmlformats.org/officeDocument/2006/relationships" xmlns:p="http://schemas.openxmlformats.org/presentationml/2006/main">
   <p:cSld>
     <p:spTree>
@@ -4876,7 +4795,7 @@
 </p:sld>
 </file>
 
-<file path=ppt/slides/slide12.xml><?xml version="1.0" encoding="utf-8"?>
+<file path=ppt/slides/slide11.xml><?xml version="1.0" encoding="utf-8"?>
 <p:sld xmlns:a="http://schemas.openxmlformats.org/drawingml/2006/main" xmlns:r="http://schemas.openxmlformats.org/officeDocument/2006/relationships" xmlns:p="http://schemas.openxmlformats.org/presentationml/2006/main">
   <p:cSld>
     <p:spTree>
@@ -5302,7 +5221,7 @@
 </p:sld>
 </file>
 
-<file path=ppt/slides/slide13.xml><?xml version="1.0" encoding="utf-8"?>
+<file path=ppt/slides/slide12.xml><?xml version="1.0" encoding="utf-8"?>
 <p:sld xmlns:a="http://schemas.openxmlformats.org/drawingml/2006/main" xmlns:r="http://schemas.openxmlformats.org/officeDocument/2006/relationships" xmlns:p="http://schemas.openxmlformats.org/presentationml/2006/main">
   <p:cSld>
     <p:spTree>
@@ -5471,7 +5390,7 @@
 </p:sld>
 </file>
 
-<file path=ppt/slides/slide14.xml><?xml version="1.0" encoding="utf-8"?>
+<file path=ppt/slides/slide13.xml><?xml version="1.0" encoding="utf-8"?>
 <p:sld xmlns:a="http://schemas.openxmlformats.org/drawingml/2006/main" xmlns:r="http://schemas.openxmlformats.org/officeDocument/2006/relationships" xmlns:p="http://schemas.openxmlformats.org/presentationml/2006/main">
   <p:cSld>
     <p:spTree>
@@ -5551,7 +5470,7 @@
             </a:r>
             <a:r>
               <a:rPr lang="ko-KR" altLang="en-US" sz="2200" dirty="0"/>
-              <a:t> 적정 수준</a:t>
+              <a:t> 허용 오차</a:t>
             </a:r>
             <a:r>
               <a:rPr lang="en-US" altLang="ko-KR" sz="2200" dirty="0"/>
@@ -6434,7 +6353,7 @@
 </p:sld>
 </file>
 
-<file path=ppt/slides/slide15.xml><?xml version="1.0" encoding="utf-8"?>
+<file path=ppt/slides/slide14.xml><?xml version="1.0" encoding="utf-8"?>
 <p:sld xmlns:a="http://schemas.openxmlformats.org/drawingml/2006/main" xmlns:r="http://schemas.openxmlformats.org/officeDocument/2006/relationships" xmlns:p="http://schemas.openxmlformats.org/presentationml/2006/main">
   <p:cSld>
     <p:spTree>
@@ -7142,7 +7061,7 @@
 </p:sld>
 </file>
 
-<file path=ppt/slides/slide16.xml><?xml version="1.0" encoding="utf-8"?>
+<file path=ppt/slides/slide15.xml><?xml version="1.0" encoding="utf-8"?>
 <p:sld xmlns:a="http://schemas.openxmlformats.org/drawingml/2006/main" xmlns:r="http://schemas.openxmlformats.org/officeDocument/2006/relationships" xmlns:p="http://schemas.openxmlformats.org/presentationml/2006/main">
   <p:cSld>
     <p:spTree>
@@ -7872,7 +7791,7 @@
 </p:sld>
 </file>
 
-<file path=ppt/slides/slide17.xml><?xml version="1.0" encoding="utf-8"?>
+<file path=ppt/slides/slide16.xml><?xml version="1.0" encoding="utf-8"?>
 <p:sld xmlns:a="http://schemas.openxmlformats.org/drawingml/2006/main" xmlns:r="http://schemas.openxmlformats.org/officeDocument/2006/relationships" xmlns:p="http://schemas.openxmlformats.org/presentationml/2006/main">
   <p:cSld>
     <p:spTree>
@@ -8163,6 +8082,24 @@
                 <a:endParaRPr lang="en-US" altLang="ko-KR" dirty="0"/>
               </a:p>
               <a:p>
+                <a:endParaRPr lang="en-US" altLang="ko-KR" dirty="0"/>
+              </a:p>
+              <a:p>
+                <a:endParaRPr lang="en-US" altLang="ko-KR" dirty="0"/>
+              </a:p>
+              <a:p>
+                <a:endParaRPr lang="en-US" altLang="ko-KR" dirty="0"/>
+              </a:p>
+              <a:p>
+                <a:endParaRPr lang="en-US" altLang="ko-KR" dirty="0"/>
+              </a:p>
+              <a:p>
+                <a:r>
+                  <a:rPr lang="en-US" altLang="ko-KR" dirty="0"/>
+                  <a:t>To be updated</a:t>
+                </a:r>
+              </a:p>
+              <a:p>
                 <a:endParaRPr lang="ko-KR" altLang="en-US" dirty="0"/>
               </a:p>
             </p:txBody>
@@ -8212,8 +8149,8 @@
           </p:sp>
         </mc:Fallback>
       </mc:AlternateContent>
-      <mc:AlternateContent xmlns:mc="http://schemas.openxmlformats.org/markup-compatibility/2006">
-        <mc:Choice xmlns:a14="http://schemas.microsoft.com/office/drawing/2010/main" Requires="a14">
+      <mc:AlternateContent xmlns:mc="http://schemas.openxmlformats.org/markup-compatibility/2006" xmlns:a14="http://schemas.microsoft.com/office/drawing/2010/main">
+        <mc:Choice Requires="a14">
           <p:sp>
             <p:nvSpPr>
               <p:cNvPr id="27" name="타원 26">
@@ -8279,7 +8216,7 @@
                       <m:sSub>
                         <m:sSubPr>
                           <m:ctrlPr>
-                            <a:rPr lang="en-US" altLang="ko-KR" sz="2400" b="1" smtClean="0">
+                            <a:rPr lang="en-US" altLang="ko-KR" sz="2400" b="1" i="1" smtClean="0">
                               <a:solidFill>
                                 <a:schemeClr val="tx1"/>
                               </a:solidFill>
@@ -8322,7 +8259,7 @@
             </p:txBody>
           </p:sp>
         </mc:Choice>
-        <mc:Fallback>
+        <mc:Fallback xmlns="">
           <p:sp>
             <p:nvSpPr>
               <p:cNvPr id="27" name="타원 26">
@@ -8435,8 +8372,8 @@
           </a:p>
         </p:txBody>
       </p:sp>
-      <mc:AlternateContent xmlns:mc="http://schemas.openxmlformats.org/markup-compatibility/2006">
-        <mc:Choice xmlns:a14="http://schemas.microsoft.com/office/drawing/2010/main" Requires="a14">
+      <mc:AlternateContent xmlns:mc="http://schemas.openxmlformats.org/markup-compatibility/2006" xmlns:a14="http://schemas.microsoft.com/office/drawing/2010/main">
+        <mc:Choice Requires="a14">
           <p:sp>
             <p:nvSpPr>
               <p:cNvPr id="29" name="타원 28">
@@ -8488,7 +8425,7 @@
                       <m:sSub>
                         <m:sSubPr>
                           <m:ctrlPr>
-                            <a:rPr lang="en-US" altLang="ko-KR" sz="2400" b="1" smtClean="0">
+                            <a:rPr lang="en-US" altLang="ko-KR" sz="2400" b="1" i="1" smtClean="0">
                               <a:solidFill>
                                 <a:schemeClr val="tx1"/>
                               </a:solidFill>
@@ -8531,7 +8468,7 @@
             </p:txBody>
           </p:sp>
         </mc:Choice>
-        <mc:Fallback>
+        <mc:Fallback xmlns="">
           <p:sp>
             <p:nvSpPr>
               <p:cNvPr id="29" name="타원 28">
@@ -8714,8 +8651,8 @@
           </a:p>
         </p:txBody>
       </p:sp>
-      <mc:AlternateContent xmlns:mc="http://schemas.openxmlformats.org/markup-compatibility/2006">
-        <mc:Choice xmlns:a14="http://schemas.microsoft.com/office/drawing/2010/main" Requires="a14">
+      <mc:AlternateContent xmlns:mc="http://schemas.openxmlformats.org/markup-compatibility/2006" xmlns:a14="http://schemas.microsoft.com/office/drawing/2010/main">
+        <mc:Choice Requires="a14">
           <p:sp>
             <p:nvSpPr>
               <p:cNvPr id="33" name="타원 32">
@@ -8781,7 +8718,7 @@
                       <m:sSub>
                         <m:sSubPr>
                           <m:ctrlPr>
-                            <a:rPr lang="en-US" altLang="ko-KR" sz="2400" b="1" smtClean="0">
+                            <a:rPr lang="en-US" altLang="ko-KR" sz="2400" b="1" i="1" smtClean="0">
                               <a:solidFill>
                                 <a:schemeClr val="tx1"/>
                               </a:solidFill>
@@ -8824,7 +8761,7 @@
             </p:txBody>
           </p:sp>
         </mc:Choice>
-        <mc:Fallback>
+        <mc:Fallback xmlns="">
           <p:sp>
             <p:nvSpPr>
               <p:cNvPr id="33" name="타원 32">
@@ -9111,8 +9048,8 @@
           </a:fontRef>
         </p:style>
       </p:cxnSp>
-      <mc:AlternateContent xmlns:mc="http://schemas.openxmlformats.org/markup-compatibility/2006">
-        <mc:Choice xmlns:a14="http://schemas.microsoft.com/office/drawing/2010/main" Requires="a14">
+      <mc:AlternateContent xmlns:mc="http://schemas.openxmlformats.org/markup-compatibility/2006" xmlns:a14="http://schemas.microsoft.com/office/drawing/2010/main">
+        <mc:Choice Requires="a14">
           <p:sp>
             <p:nvSpPr>
               <p:cNvPr id="54" name="TextBox 53">
@@ -9141,6 +9078,7 @@
               </a:bodyPr>
               <a:lstStyle/>
               <a:p>
+                <a:pPr/>
                 <a14:m>
                   <m:oMathPara xmlns:m="http://schemas.openxmlformats.org/officeDocument/2006/math">
                     <m:oMathParaPr>
@@ -9178,6 +9116,7 @@
                 <a:endParaRPr lang="en-US" altLang="ko-KR" b="0" dirty="0"/>
               </a:p>
               <a:p>
+                <a:pPr/>
                 <a14:m>
                   <m:oMathPara xmlns:m="http://schemas.openxmlformats.org/officeDocument/2006/math">
                     <m:oMathParaPr>
@@ -9218,6 +9157,7 @@
                 <a:endParaRPr lang="en-US" altLang="ko-KR" dirty="0"/>
               </a:p>
               <a:p>
+                <a:pPr/>
                 <a14:m>
                   <m:oMathPara xmlns:m="http://schemas.openxmlformats.org/officeDocument/2006/math">
                     <m:oMathParaPr>
@@ -9260,7 +9200,7 @@
             </p:txBody>
           </p:sp>
         </mc:Choice>
-        <mc:Fallback>
+        <mc:Fallback xmlns="">
           <p:sp>
             <p:nvSpPr>
               <p:cNvPr id="54" name="TextBox 53">
@@ -9452,7 +9392,7 @@
 </p:sld>
 </file>
 
-<file path=ppt/slides/slide18.xml><?xml version="1.0" encoding="utf-8"?>
+<file path=ppt/slides/slide17.xml><?xml version="1.0" encoding="utf-8"?>
 <p:sld xmlns:a="http://schemas.openxmlformats.org/drawingml/2006/main" xmlns:r="http://schemas.openxmlformats.org/officeDocument/2006/relationships" xmlns:p="http://schemas.openxmlformats.org/presentationml/2006/main">
   <p:cSld>
     <p:spTree>
@@ -9532,6 +9472,10 @@
           <a:bodyPr/>
           <a:lstStyle/>
           <a:p>
+            <a:r>
+              <a:rPr lang="en-US" altLang="ko-KR" dirty="0"/>
+              <a:t>To be updated</a:t>
+            </a:r>
             <a:endParaRPr lang="ko-KR" altLang="en-US" dirty="0"/>
           </a:p>
         </p:txBody>
@@ -10630,6 +10574,99 @@
 </p:sld>
 </file>
 
+<file path=ppt/slides/slide18.xml><?xml version="1.0" encoding="utf-8"?>
+<p:sld xmlns:a="http://schemas.openxmlformats.org/drawingml/2006/main" xmlns:r="http://schemas.openxmlformats.org/officeDocument/2006/relationships" xmlns:p="http://schemas.openxmlformats.org/presentationml/2006/main">
+  <p:cSld>
+    <p:spTree>
+      <p:nvGrpSpPr>
+        <p:cNvPr id="1" name=""/>
+        <p:cNvGrpSpPr/>
+        <p:nvPr/>
+      </p:nvGrpSpPr>
+      <p:grpSpPr>
+        <a:xfrm>
+          <a:off x="0" y="0"/>
+          <a:ext cx="0" cy="0"/>
+          <a:chOff x="0" y="0"/>
+          <a:chExt cx="0" cy="0"/>
+        </a:xfrm>
+      </p:grpSpPr>
+      <p:sp>
+        <p:nvSpPr>
+          <p:cNvPr id="2" name="제목 1">
+            <a:extLst>
+              <a:ext uri="{FF2B5EF4-FFF2-40B4-BE49-F238E27FC236}">
+                <a16:creationId xmlns:a16="http://schemas.microsoft.com/office/drawing/2014/main" id="{1FADEE26-0999-4C2D-A890-9669CCE08469}"/>
+              </a:ext>
+            </a:extLst>
+          </p:cNvPr>
+          <p:cNvSpPr>
+            <a:spLocks noGrp="1"/>
+          </p:cNvSpPr>
+          <p:nvPr>
+            <p:ph type="title"/>
+          </p:nvPr>
+        </p:nvSpPr>
+        <p:spPr/>
+        <p:txBody>
+          <a:bodyPr/>
+          <a:lstStyle/>
+          <a:p>
+            <a:r>
+              <a:rPr lang="ko-KR" altLang="en-US" dirty="0"/>
+              <a:t>예시 </a:t>
+            </a:r>
+            <a:r>
+              <a:rPr lang="en-US" altLang="ko-KR" dirty="0"/>
+              <a:t>- XOR</a:t>
+            </a:r>
+            <a:endParaRPr lang="ko-KR" altLang="en-US" dirty="0"/>
+          </a:p>
+        </p:txBody>
+      </p:sp>
+      <p:pic>
+        <p:nvPicPr>
+          <p:cNvPr id="5" name="그림 4" descr="화면 캡처">
+            <a:extLst>
+              <a:ext uri="{FF2B5EF4-FFF2-40B4-BE49-F238E27FC236}">
+                <a16:creationId xmlns:a16="http://schemas.microsoft.com/office/drawing/2014/main" id="{84FCB8A6-456F-4CEC-AF3D-DAC5E264A9ED}"/>
+              </a:ext>
+            </a:extLst>
+          </p:cNvPr>
+          <p:cNvPicPr>
+            <a:picLocks noChangeAspect="1"/>
+          </p:cNvPicPr>
+          <p:nvPr/>
+        </p:nvPicPr>
+        <p:blipFill>
+          <a:blip r:embed="rId2"/>
+          <a:stretch>
+            <a:fillRect/>
+          </a:stretch>
+        </p:blipFill>
+        <p:spPr>
+          <a:xfrm>
+            <a:off x="1214284" y="1845734"/>
+            <a:ext cx="4397335" cy="4314579"/>
+          </a:xfrm>
+          <a:prstGeom prst="rect">
+            <a:avLst/>
+          </a:prstGeom>
+        </p:spPr>
+      </p:pic>
+    </p:spTree>
+    <p:extLst>
+      <p:ext uri="{BB962C8B-B14F-4D97-AF65-F5344CB8AC3E}">
+        <p14:creationId xmlns:p14="http://schemas.microsoft.com/office/powerpoint/2010/main" val="1121293169"/>
+      </p:ext>
+    </p:extLst>
+  </p:cSld>
+  <p:clrMapOvr>
+    <a:masterClrMapping/>
+  </p:clrMapOvr>
+</p:sld>
+</file>
+
 <file path=ppt/slides/slide19.xml><?xml version="1.0" encoding="utf-8"?>
 <p:sld xmlns:a="http://schemas.openxmlformats.org/drawingml/2006/main" xmlns:r="http://schemas.openxmlformats.org/officeDocument/2006/relationships" xmlns:p="http://schemas.openxmlformats.org/presentationml/2006/main">
   <p:cSld>
@@ -10652,7 +10689,7 @@
           <p:cNvPr id="2" name="제목 1">
             <a:extLst>
               <a:ext uri="{FF2B5EF4-FFF2-40B4-BE49-F238E27FC236}">
-                <a16:creationId xmlns:a16="http://schemas.microsoft.com/office/drawing/2014/main" id="{E8A9F982-730B-429D-B15D-2F4D8E42151E}"/>
+                <a16:creationId xmlns:a16="http://schemas.microsoft.com/office/drawing/2014/main" id="{5DE625A9-893C-422D-82CB-24E8B1AFC2C5}"/>
               </a:ext>
             </a:extLst>
           </p:cNvPr>
@@ -10669,18 +10706,9 @@
           <a:lstStyle/>
           <a:p>
             <a:r>
-              <a:rPr lang="en-US" altLang="ko-KR" dirty="0"/>
-              <a:t>Activation</a:t>
-            </a:r>
-            <a:r>
               <a:rPr lang="ko-KR" altLang="en-US" dirty="0"/>
-              <a:t> </a:t>
-            </a:r>
-            <a:r>
-              <a:rPr lang="en-US" altLang="ko-KR" dirty="0"/>
-              <a:t>function</a:t>
-            </a:r>
-            <a:endParaRPr lang="ko-KR" altLang="en-US" dirty="0"/>
+              <a:t>추가자료</a:t>
+            </a:r>
           </a:p>
         </p:txBody>
       </p:sp>
@@ -10689,7 +10717,7 @@
           <p:cNvPr id="3" name="내용 개체 틀 2">
             <a:extLst>
               <a:ext uri="{FF2B5EF4-FFF2-40B4-BE49-F238E27FC236}">
-                <a16:creationId xmlns:a16="http://schemas.microsoft.com/office/drawing/2014/main" id="{13C49002-4981-425C-8DC7-45D7807DB31B}"/>
+                <a16:creationId xmlns:a16="http://schemas.microsoft.com/office/drawing/2014/main" id="{414CF1CC-4F18-4E4D-B525-0B70B200FEE9}"/>
               </a:ext>
             </a:extLst>
           </p:cNvPr>
@@ -10706,123 +10734,31 @@
           <a:lstStyle/>
           <a:p>
             <a:r>
-              <a:rPr lang="ko-KR" altLang="en-US" dirty="0"/>
-              <a:t>네트워크에 비선형을 추가하기 위해 사용됨</a:t>
-            </a:r>
+              <a:rPr lang="en-US" altLang="ko-KR" dirty="0"/>
+              <a:t>Activation Function</a:t>
+            </a:r>
+          </a:p>
+          <a:p>
+            <a:r>
+              <a:rPr lang="en-US" altLang="ko-KR" dirty="0"/>
+              <a:t>Loss Function</a:t>
+            </a:r>
+          </a:p>
+          <a:p>
+            <a:r>
+              <a:rPr lang="en-US" altLang="ko-KR" dirty="0"/>
+              <a:t>Optimizers</a:t>
+            </a:r>
+          </a:p>
+          <a:p>
             <a:endParaRPr lang="en-US" altLang="ko-KR" dirty="0"/>
-          </a:p>
-          <a:p>
-            <a:endParaRPr lang="en-US" altLang="ko-KR" dirty="0"/>
-          </a:p>
-          <a:p>
-            <a:r>
-              <a:rPr lang="en-US" altLang="ko-KR" dirty="0"/>
-              <a:t>Why?</a:t>
-            </a:r>
-          </a:p>
-          <a:p>
-            <a:pPr lvl="1"/>
-            <a:r>
-              <a:rPr lang="en-US" altLang="ko-KR" dirty="0"/>
-              <a:t>H(X) = f( g( </a:t>
-            </a:r>
-            <a:r>
-              <a:rPr lang="en-US" altLang="ko-KR" dirty="0" err="1"/>
-              <a:t>i</a:t>
-            </a:r>
-            <a:r>
-              <a:rPr lang="en-US" altLang="ko-KR" dirty="0"/>
-              <a:t> … (X)))</a:t>
-            </a:r>
-            <a:r>
-              <a:rPr lang="ko-KR" altLang="en-US" dirty="0"/>
-              <a:t>  </a:t>
-            </a:r>
-            <a:r>
-              <a:rPr lang="en-US" altLang="ko-KR" dirty="0"/>
-              <a:t>-&gt;</a:t>
-            </a:r>
-            <a:r>
-              <a:rPr lang="ko-KR" altLang="en-US" dirty="0"/>
-              <a:t>  </a:t>
-            </a:r>
-            <a:r>
-              <a:rPr lang="en-US" altLang="ko-KR" dirty="0"/>
-              <a:t>H(x) = WX -&gt; </a:t>
-            </a:r>
-            <a:r>
-              <a:rPr lang="ko-KR" altLang="en-US" dirty="0"/>
-              <a:t>아무리 층이 많아도 선형함수</a:t>
-            </a:r>
-            <a:endParaRPr lang="en-US" altLang="ko-KR" dirty="0"/>
-          </a:p>
-          <a:p>
-            <a:r>
-              <a:rPr lang="en-US" altLang="ko-KR" dirty="0"/>
-              <a:t>Activation function </a:t>
-            </a:r>
-            <a:r>
-              <a:rPr lang="ko-KR" altLang="en-US" dirty="0"/>
-              <a:t>추가</a:t>
-            </a:r>
-            <a:endParaRPr lang="en-US" altLang="ko-KR" dirty="0"/>
-          </a:p>
-          <a:p>
-            <a:pPr lvl="1"/>
-            <a:r>
-              <a:rPr lang="ko-KR" altLang="en-US" dirty="0"/>
-              <a:t>각 층의 출력 결과를 비선형화 하고 다음 층에 넘겨줌</a:t>
-            </a:r>
-            <a:r>
-              <a:rPr lang="en-US" altLang="ko-KR" dirty="0"/>
-              <a:t>.</a:t>
-            </a:r>
-          </a:p>
-          <a:p>
-            <a:pPr lvl="1"/>
-            <a:r>
-              <a:rPr lang="en-US" altLang="ko-KR" dirty="0"/>
-              <a:t>H(X) = </a:t>
-            </a:r>
-            <a:r>
-              <a:rPr lang="en-US" altLang="ko-KR" dirty="0" err="1"/>
-              <a:t>activationfunction</a:t>
-            </a:r>
-            <a:r>
-              <a:rPr lang="en-US" altLang="ko-KR" dirty="0"/>
-              <a:t>(f( </a:t>
-            </a:r>
-            <a:r>
-              <a:rPr lang="en-US" altLang="ko-KR" dirty="0" err="1"/>
-              <a:t>activationfunction</a:t>
-            </a:r>
-            <a:r>
-              <a:rPr lang="en-US" altLang="ko-KR" dirty="0"/>
-              <a:t>(g( </a:t>
-            </a:r>
-            <a:r>
-              <a:rPr lang="en-US" altLang="ko-KR" dirty="0" err="1"/>
-              <a:t>activationfunction</a:t>
-            </a:r>
-            <a:r>
-              <a:rPr lang="en-US" altLang="ko-KR" dirty="0"/>
-              <a:t>(</a:t>
-            </a:r>
-            <a:r>
-              <a:rPr lang="en-US" altLang="ko-KR" dirty="0" err="1"/>
-              <a:t>i</a:t>
-            </a:r>
-            <a:r>
-              <a:rPr lang="en-US" altLang="ko-KR" dirty="0"/>
-              <a:t> … (X))))))</a:t>
-            </a:r>
           </a:p>
         </p:txBody>
       </p:sp>
     </p:spTree>
     <p:extLst>
       <p:ext uri="{BB962C8B-B14F-4D97-AF65-F5344CB8AC3E}">
-        <p14:creationId xmlns:p14="http://schemas.microsoft.com/office/powerpoint/2010/main" val="590175493"/>
+        <p14:creationId xmlns:p14="http://schemas.microsoft.com/office/powerpoint/2010/main" val="2055968999"/>
       </p:ext>
     </p:extLst>
   </p:cSld>
@@ -10897,17 +10833,13 @@
         <p:spPr/>
         <p:txBody>
           <a:bodyPr>
-            <a:normAutofit fontScale="92500" lnSpcReduction="10000"/>
+            <a:normAutofit/>
           </a:bodyPr>
           <a:lstStyle/>
           <a:p>
             <a:r>
               <a:rPr lang="ko-KR" altLang="en-US" dirty="0"/>
-              <a:t>단일</a:t>
-            </a:r>
-            <a:r>
-              <a:rPr lang="en-US" altLang="ko-KR" dirty="0"/>
-              <a:t> </a:t>
+              <a:t>단일 </a:t>
             </a:r>
             <a:r>
               <a:rPr lang="ko-KR" altLang="en-US" dirty="0" err="1"/>
@@ -10918,8 +10850,18 @@
           <a:p>
             <a:pPr lvl="1"/>
             <a:r>
+              <a:rPr lang="en-US" altLang="ko-KR" dirty="0"/>
+              <a:t>…</a:t>
+            </a:r>
+          </a:p>
+          <a:p>
+            <a:r>
               <a:rPr lang="ko-KR" altLang="en-US" dirty="0"/>
-              <a:t>설명</a:t>
+              <a:t>다층 </a:t>
+            </a:r>
+            <a:r>
+              <a:rPr lang="ko-KR" altLang="en-US" dirty="0" err="1"/>
+              <a:t>퍼셉트론</a:t>
             </a:r>
             <a:endParaRPr lang="en-US" altLang="ko-KR" dirty="0"/>
           </a:p>
@@ -10927,125 +10869,28 @@
             <a:pPr lvl="1"/>
             <a:r>
               <a:rPr lang="en-US" altLang="ko-KR" dirty="0"/>
-              <a:t>Activation </a:t>
-            </a:r>
+              <a:t>…</a:t>
+            </a:r>
+          </a:p>
+          <a:p>
             <a:r>
               <a:rPr lang="ko-KR" altLang="en-US" dirty="0"/>
-              <a:t>함수</a:t>
-            </a:r>
+              <a:t>추가자료</a:t>
+            </a:r>
+            <a:endParaRPr lang="en-US" altLang="ko-KR" dirty="0"/>
+          </a:p>
+          <a:p>
+            <a:pPr lvl="1"/>
             <a:r>
               <a:rPr lang="en-US" altLang="ko-KR" dirty="0"/>
-              <a:t>(</a:t>
-            </a:r>
-            <a:r>
-              <a:rPr lang="ko-KR" altLang="en-US" dirty="0"/>
-              <a:t>여러가지</a:t>
-            </a:r>
-            <a:r>
-              <a:rPr lang="en-US" altLang="ko-KR" dirty="0"/>
-              <a:t>)</a:t>
-            </a:r>
-          </a:p>
-          <a:p>
-            <a:pPr lvl="1"/>
+              <a:t>…</a:t>
+            </a:r>
+          </a:p>
+          <a:p>
             <a:r>
               <a:rPr lang="ko-KR" altLang="en-US" dirty="0" err="1"/>
-              <a:t>백프로파게이션</a:t>
-            </a:r>
-            <a:r>
-              <a:rPr lang="en-US" altLang="ko-KR" dirty="0"/>
-              <a:t>(</a:t>
-            </a:r>
-            <a:r>
-              <a:rPr lang="ko-KR" altLang="en-US" dirty="0"/>
-              <a:t>여러가지</a:t>
-            </a:r>
-            <a:r>
-              <a:rPr lang="en-US" altLang="ko-KR" dirty="0"/>
-              <a:t>)</a:t>
-            </a:r>
-          </a:p>
-          <a:p>
-            <a:pPr lvl="1"/>
-            <a:r>
-              <a:rPr lang="ko-KR" altLang="en-US" dirty="0"/>
-              <a:t>소스</a:t>
-            </a:r>
-            <a:r>
-              <a:rPr lang="en-US" altLang="ko-KR" dirty="0"/>
-              <a:t>(and.py)</a:t>
-            </a:r>
-          </a:p>
-          <a:p>
-            <a:pPr lvl="1"/>
-            <a:r>
-              <a:rPr lang="ko-KR" altLang="en-US" dirty="0"/>
-              <a:t>한계</a:t>
-            </a:r>
-            <a:endParaRPr lang="en-US" altLang="ko-KR" dirty="0"/>
-          </a:p>
-          <a:p>
-            <a:r>
-              <a:rPr lang="ko-KR" altLang="en-US" dirty="0"/>
-              <a:t>다중 </a:t>
-            </a:r>
-            <a:r>
-              <a:rPr lang="en-US" altLang="ko-KR" dirty="0"/>
-              <a:t>perceptron</a:t>
-            </a:r>
-          </a:p>
-          <a:p>
-            <a:pPr lvl="1"/>
-            <a:r>
-              <a:rPr lang="ko-KR" altLang="en-US" dirty="0"/>
-              <a:t>설명</a:t>
-            </a:r>
-            <a:endParaRPr lang="en-US" altLang="ko-KR" dirty="0"/>
-          </a:p>
-          <a:p>
-            <a:pPr lvl="1"/>
-            <a:r>
-              <a:rPr lang="ko-KR" altLang="en-US" dirty="0" err="1"/>
-              <a:t>백프로파게이션</a:t>
-            </a:r>
-            <a:endParaRPr lang="en-US" altLang="ko-KR" dirty="0"/>
-          </a:p>
-          <a:p>
-            <a:pPr lvl="1"/>
-            <a:r>
-              <a:rPr lang="ko-KR" altLang="en-US" dirty="0"/>
-              <a:t>소스</a:t>
-            </a:r>
-            <a:r>
-              <a:rPr lang="en-US" altLang="ko-KR" dirty="0"/>
-              <a:t>(or.py)</a:t>
-            </a:r>
-          </a:p>
-          <a:p>
-            <a:r>
-              <a:rPr lang="ko-KR" altLang="en-US" dirty="0" err="1"/>
-              <a:t>피드포워드</a:t>
-            </a:r>
-            <a:endParaRPr lang="en-US" altLang="ko-KR" dirty="0"/>
-          </a:p>
-          <a:p>
-            <a:pPr lvl="1"/>
-            <a:r>
-              <a:rPr lang="ko-KR" altLang="en-US" dirty="0"/>
-              <a:t>설명</a:t>
-            </a:r>
-            <a:endParaRPr lang="en-US" altLang="ko-KR" dirty="0"/>
-          </a:p>
-          <a:p>
-            <a:pPr lvl="1"/>
-            <a:r>
-              <a:rPr lang="ko-KR" altLang="en-US" dirty="0"/>
-              <a:t>소스</a:t>
-            </a:r>
-            <a:endParaRPr lang="en-US" altLang="ko-KR" dirty="0"/>
-          </a:p>
-          <a:p>
-            <a:pPr lvl="1"/>
+              <a:t>추가예시</a:t>
+            </a:r>
             <a:endParaRPr lang="ko-KR" altLang="en-US" dirty="0"/>
           </a:p>
         </p:txBody>
@@ -11111,12 +10956,9 @@
             </a:r>
             <a:r>
               <a:rPr lang="en-US" altLang="ko-KR" dirty="0"/>
-              <a:t>function </a:t>
-            </a:r>
-            <a:r>
-              <a:rPr lang="ko-KR" altLang="en-US" dirty="0"/>
-              <a:t>종류</a:t>
-            </a:r>
+              <a:t>function</a:t>
+            </a:r>
+            <a:endParaRPr lang="ko-KR" altLang="en-US" dirty="0"/>
           </a:p>
         </p:txBody>
       </p:sp>
@@ -11143,6 +10985,211 @@
           <a:p>
             <a:r>
               <a:rPr lang="ko-KR" altLang="en-US" dirty="0"/>
+              <a:t>네트워크에 비선형을 추가하기 위해 사용됨</a:t>
+            </a:r>
+            <a:endParaRPr lang="en-US" altLang="ko-KR" dirty="0"/>
+          </a:p>
+          <a:p>
+            <a:endParaRPr lang="en-US" altLang="ko-KR" dirty="0"/>
+          </a:p>
+          <a:p>
+            <a:r>
+              <a:rPr lang="en-US" altLang="ko-KR" dirty="0"/>
+              <a:t>Why?</a:t>
+            </a:r>
+          </a:p>
+          <a:p>
+            <a:pPr lvl="1"/>
+            <a:r>
+              <a:rPr lang="en-US" altLang="ko-KR" dirty="0"/>
+              <a:t>H(X) = f( g( </a:t>
+            </a:r>
+            <a:r>
+              <a:rPr lang="en-US" altLang="ko-KR" dirty="0" err="1"/>
+              <a:t>i</a:t>
+            </a:r>
+            <a:r>
+              <a:rPr lang="en-US" altLang="ko-KR" dirty="0"/>
+              <a:t> … (X)))</a:t>
+            </a:r>
+            <a:r>
+              <a:rPr lang="ko-KR" altLang="en-US" dirty="0"/>
+              <a:t>  </a:t>
+            </a:r>
+            <a:r>
+              <a:rPr lang="en-US" altLang="ko-KR" dirty="0"/>
+              <a:t>-&gt;</a:t>
+            </a:r>
+            <a:r>
+              <a:rPr lang="ko-KR" altLang="en-US" dirty="0"/>
+              <a:t>  </a:t>
+            </a:r>
+            <a:r>
+              <a:rPr lang="en-US" altLang="ko-KR" dirty="0"/>
+              <a:t>H(x) = WX -&gt; </a:t>
+            </a:r>
+            <a:r>
+              <a:rPr lang="ko-KR" altLang="en-US" dirty="0"/>
+              <a:t>아무리 층이 많아도 선형함수</a:t>
+            </a:r>
+            <a:endParaRPr lang="en-US" altLang="ko-KR" dirty="0"/>
+          </a:p>
+          <a:p>
+            <a:r>
+              <a:rPr lang="en-US" altLang="ko-KR" dirty="0"/>
+              <a:t>Activation function </a:t>
+            </a:r>
+            <a:r>
+              <a:rPr lang="ko-KR" altLang="en-US" dirty="0"/>
+              <a:t>추가</a:t>
+            </a:r>
+            <a:endParaRPr lang="en-US" altLang="ko-KR" dirty="0"/>
+          </a:p>
+          <a:p>
+            <a:pPr lvl="1"/>
+            <a:r>
+              <a:rPr lang="ko-KR" altLang="en-US" dirty="0"/>
+              <a:t>각 층의 출력 결과를 비선형화 하고 다음 층에 넘겨줌</a:t>
+            </a:r>
+            <a:r>
+              <a:rPr lang="en-US" altLang="ko-KR" dirty="0"/>
+              <a:t>.</a:t>
+            </a:r>
+          </a:p>
+          <a:p>
+            <a:pPr lvl="1"/>
+            <a:r>
+              <a:rPr lang="en-US" altLang="ko-KR" dirty="0"/>
+              <a:t>H(X) = </a:t>
+            </a:r>
+            <a:r>
+              <a:rPr lang="en-US" altLang="ko-KR" dirty="0" err="1"/>
+              <a:t>activationfunction</a:t>
+            </a:r>
+            <a:r>
+              <a:rPr lang="en-US" altLang="ko-KR" dirty="0"/>
+              <a:t>(f( </a:t>
+            </a:r>
+            <a:r>
+              <a:rPr lang="en-US" altLang="ko-KR" dirty="0" err="1"/>
+              <a:t>activationfunction</a:t>
+            </a:r>
+            <a:r>
+              <a:rPr lang="en-US" altLang="ko-KR" dirty="0"/>
+              <a:t>(g( </a:t>
+            </a:r>
+            <a:r>
+              <a:rPr lang="en-US" altLang="ko-KR" dirty="0" err="1"/>
+              <a:t>activationfunction</a:t>
+            </a:r>
+            <a:r>
+              <a:rPr lang="en-US" altLang="ko-KR" dirty="0"/>
+              <a:t>(</a:t>
+            </a:r>
+            <a:r>
+              <a:rPr lang="en-US" altLang="ko-KR" dirty="0" err="1"/>
+              <a:t>i</a:t>
+            </a:r>
+            <a:r>
+              <a:rPr lang="en-US" altLang="ko-KR" dirty="0"/>
+              <a:t> … (X))))))</a:t>
+            </a:r>
+          </a:p>
+        </p:txBody>
+      </p:sp>
+    </p:spTree>
+    <p:extLst>
+      <p:ext uri="{BB962C8B-B14F-4D97-AF65-F5344CB8AC3E}">
+        <p14:creationId xmlns:p14="http://schemas.microsoft.com/office/powerpoint/2010/main" val="590175493"/>
+      </p:ext>
+    </p:extLst>
+  </p:cSld>
+  <p:clrMapOvr>
+    <a:masterClrMapping/>
+  </p:clrMapOvr>
+</p:sld>
+</file>
+
+<file path=ppt/slides/slide21.xml><?xml version="1.0" encoding="utf-8"?>
+<p:sld xmlns:a="http://schemas.openxmlformats.org/drawingml/2006/main" xmlns:r="http://schemas.openxmlformats.org/officeDocument/2006/relationships" xmlns:p="http://schemas.openxmlformats.org/presentationml/2006/main">
+  <p:cSld>
+    <p:spTree>
+      <p:nvGrpSpPr>
+        <p:cNvPr id="1" name=""/>
+        <p:cNvGrpSpPr/>
+        <p:nvPr/>
+      </p:nvGrpSpPr>
+      <p:grpSpPr>
+        <a:xfrm>
+          <a:off x="0" y="0"/>
+          <a:ext cx="0" cy="0"/>
+          <a:chOff x="0" y="0"/>
+          <a:chExt cx="0" cy="0"/>
+        </a:xfrm>
+      </p:grpSpPr>
+      <p:sp>
+        <p:nvSpPr>
+          <p:cNvPr id="2" name="제목 1">
+            <a:extLst>
+              <a:ext uri="{FF2B5EF4-FFF2-40B4-BE49-F238E27FC236}">
+                <a16:creationId xmlns:a16="http://schemas.microsoft.com/office/drawing/2014/main" id="{E8A9F982-730B-429D-B15D-2F4D8E42151E}"/>
+              </a:ext>
+            </a:extLst>
+          </p:cNvPr>
+          <p:cNvSpPr>
+            <a:spLocks noGrp="1"/>
+          </p:cNvSpPr>
+          <p:nvPr>
+            <p:ph type="title"/>
+          </p:nvPr>
+        </p:nvSpPr>
+        <p:spPr/>
+        <p:txBody>
+          <a:bodyPr/>
+          <a:lstStyle/>
+          <a:p>
+            <a:r>
+              <a:rPr lang="en-US" altLang="ko-KR" dirty="0"/>
+              <a:t>Activation</a:t>
+            </a:r>
+            <a:r>
+              <a:rPr lang="ko-KR" altLang="en-US" dirty="0"/>
+              <a:t> </a:t>
+            </a:r>
+            <a:r>
+              <a:rPr lang="en-US" altLang="ko-KR" dirty="0"/>
+              <a:t>function </a:t>
+            </a:r>
+            <a:r>
+              <a:rPr lang="ko-KR" altLang="en-US" dirty="0"/>
+              <a:t>종류</a:t>
+            </a:r>
+          </a:p>
+        </p:txBody>
+      </p:sp>
+      <p:sp>
+        <p:nvSpPr>
+          <p:cNvPr id="3" name="내용 개체 틀 2">
+            <a:extLst>
+              <a:ext uri="{FF2B5EF4-FFF2-40B4-BE49-F238E27FC236}">
+                <a16:creationId xmlns:a16="http://schemas.microsoft.com/office/drawing/2014/main" id="{13C49002-4981-425C-8DC7-45D7807DB31B}"/>
+              </a:ext>
+            </a:extLst>
+          </p:cNvPr>
+          <p:cNvSpPr>
+            <a:spLocks noGrp="1"/>
+          </p:cNvSpPr>
+          <p:nvPr>
+            <p:ph idx="1"/>
+          </p:nvPr>
+        </p:nvSpPr>
+        <p:spPr/>
+        <p:txBody>
+          <a:bodyPr/>
+          <a:lstStyle/>
+          <a:p>
+            <a:r>
+              <a:rPr lang="ko-KR" altLang="en-US" dirty="0"/>
               <a:t>활성 함수에 따라 학습 성능이 달라진다</a:t>
             </a:r>
             <a:r>
@@ -11209,7 +11256,7 @@
 </p:sld>
 </file>
 
-<file path=ppt/slides/slide21.xml><?xml version="1.0" encoding="utf-8"?>
+<file path=ppt/slides/slide22.xml><?xml version="1.0" encoding="utf-8"?>
 <p:sld xmlns:a="http://schemas.openxmlformats.org/drawingml/2006/main" xmlns:r="http://schemas.openxmlformats.org/officeDocument/2006/relationships" xmlns:p="http://schemas.openxmlformats.org/presentationml/2006/main">
   <p:cSld>
     <p:spTree>
@@ -11285,8 +11332,8 @@
           </a:p>
         </p:txBody>
       </p:sp>
-      <mc:AlternateContent xmlns:mc="http://schemas.openxmlformats.org/markup-compatibility/2006">
-        <mc:Choice xmlns:a14="http://schemas.microsoft.com/office/drawing/2010/main" Requires="a14">
+      <mc:AlternateContent xmlns:mc="http://schemas.openxmlformats.org/markup-compatibility/2006" xmlns:a14="http://schemas.microsoft.com/office/drawing/2010/main">
+        <mc:Choice Requires="a14">
           <p:sp>
             <p:nvSpPr>
               <p:cNvPr id="3" name="내용 개체 틀 2">
@@ -11412,7 +11459,7 @@
             </p:txBody>
           </p:sp>
         </mc:Choice>
-        <mc:Fallback>
+        <mc:Fallback xmlns="">
           <p:sp>
             <p:nvSpPr>
               <p:cNvPr id="3" name="내용 개체 틀 2">
@@ -11465,7 +11512,7 @@
 </p:sld>
 </file>
 
-<file path=ppt/slides/slide22.xml><?xml version="1.0" encoding="utf-8"?>
+<file path=ppt/slides/slide23.xml><?xml version="1.0" encoding="utf-8"?>
 <p:sld xmlns:a="http://schemas.openxmlformats.org/drawingml/2006/main" xmlns:r="http://schemas.openxmlformats.org/officeDocument/2006/relationships" xmlns:p="http://schemas.openxmlformats.org/presentationml/2006/main">
   <p:cSld>
     <p:spTree>
@@ -11511,8 +11558,8 @@
           </a:p>
         </p:txBody>
       </p:sp>
-      <mc:AlternateContent xmlns:mc="http://schemas.openxmlformats.org/markup-compatibility/2006">
-        <mc:Choice xmlns:a14="http://schemas.microsoft.com/office/drawing/2010/main" Requires="a14">
+      <mc:AlternateContent xmlns:mc="http://schemas.openxmlformats.org/markup-compatibility/2006" xmlns:a14="http://schemas.microsoft.com/office/drawing/2010/main">
+        <mc:Choice Requires="a14">
           <p:sp>
             <p:nvSpPr>
               <p:cNvPr id="3" name="내용 개체 틀 2">
@@ -11725,7 +11772,7 @@
             </p:txBody>
           </p:sp>
         </mc:Choice>
-        <mc:Fallback>
+        <mc:Fallback xmlns="">
           <p:sp>
             <p:nvSpPr>
               <p:cNvPr id="3" name="내용 개체 틀 2">
@@ -11872,237 +11919,6 @@
 </p:sld>
 </file>
 
-<file path=ppt/slides/slide23.xml><?xml version="1.0" encoding="utf-8"?>
-<p:sld xmlns:a="http://schemas.openxmlformats.org/drawingml/2006/main" xmlns:r="http://schemas.openxmlformats.org/officeDocument/2006/relationships" xmlns:p="http://schemas.openxmlformats.org/presentationml/2006/main">
-  <p:cSld>
-    <p:spTree>
-      <p:nvGrpSpPr>
-        <p:cNvPr id="1" name=""/>
-        <p:cNvGrpSpPr/>
-        <p:nvPr/>
-      </p:nvGrpSpPr>
-      <p:grpSpPr>
-        <a:xfrm>
-          <a:off x="0" y="0"/>
-          <a:ext cx="0" cy="0"/>
-          <a:chOff x="0" y="0"/>
-          <a:chExt cx="0" cy="0"/>
-        </a:xfrm>
-      </p:grpSpPr>
-      <p:sp>
-        <p:nvSpPr>
-          <p:cNvPr id="2" name="제목 1">
-            <a:extLst>
-              <a:ext uri="{FF2B5EF4-FFF2-40B4-BE49-F238E27FC236}">
-                <a16:creationId xmlns:a16="http://schemas.microsoft.com/office/drawing/2014/main" id="{6DF80702-750D-44FC-9252-1AC96CA45019}"/>
-              </a:ext>
-            </a:extLst>
-          </p:cNvPr>
-          <p:cNvSpPr>
-            <a:spLocks noGrp="1"/>
-          </p:cNvSpPr>
-          <p:nvPr>
-            <p:ph type="title"/>
-          </p:nvPr>
-        </p:nvSpPr>
-        <p:spPr/>
-        <p:txBody>
-          <a:bodyPr/>
-          <a:lstStyle/>
-          <a:p>
-            <a:r>
-              <a:rPr lang="en-US" altLang="ko-KR" dirty="0"/>
-              <a:t>Activation function – sigmoid(2)</a:t>
-            </a:r>
-            <a:endParaRPr lang="ko-KR" altLang="en-US" dirty="0"/>
-          </a:p>
-        </p:txBody>
-      </p:sp>
-      <p:sp>
-        <p:nvSpPr>
-          <p:cNvPr id="3" name="내용 개체 틀 2">
-            <a:extLst>
-              <a:ext uri="{FF2B5EF4-FFF2-40B4-BE49-F238E27FC236}">
-                <a16:creationId xmlns:a16="http://schemas.microsoft.com/office/drawing/2014/main" id="{D944618D-A2BB-4041-844C-992E1D546D87}"/>
-              </a:ext>
-            </a:extLst>
-          </p:cNvPr>
-          <p:cNvSpPr>
-            <a:spLocks noGrp="1"/>
-          </p:cNvSpPr>
-          <p:nvPr>
-            <p:ph idx="1"/>
-          </p:nvPr>
-        </p:nvSpPr>
-        <p:spPr>
-          <a:xfrm>
-            <a:off x="1097280" y="1845734"/>
-            <a:ext cx="10058400" cy="4023360"/>
-          </a:xfrm>
-        </p:spPr>
-        <p:txBody>
-          <a:bodyPr/>
-          <a:lstStyle/>
-          <a:p>
-            <a:r>
-              <a:rPr lang="en-US" altLang="ko-KR" dirty="0"/>
-              <a:t>Gradient Vanishing (</a:t>
-            </a:r>
-            <a:r>
-              <a:rPr lang="ko-KR" altLang="en-US" dirty="0" err="1"/>
-              <a:t>그라디언트가</a:t>
-            </a:r>
-            <a:r>
-              <a:rPr lang="ko-KR" altLang="en-US" dirty="0"/>
-              <a:t> 죽는 현상 </a:t>
-            </a:r>
-            <a:r>
-              <a:rPr lang="en-US" altLang="ko-KR" dirty="0"/>
-              <a:t>-&gt; </a:t>
-            </a:r>
-            <a:r>
-              <a:rPr lang="ko-KR" altLang="en-US" dirty="0"/>
-              <a:t>학습이 되지 않는다</a:t>
-            </a:r>
-            <a:r>
-              <a:rPr lang="en-US" altLang="ko-KR" dirty="0"/>
-              <a:t>)</a:t>
-            </a:r>
-          </a:p>
-          <a:p>
-            <a:r>
-              <a:rPr lang="ko-KR" altLang="en-US" dirty="0"/>
-              <a:t>지수함수라서 계산이 복잡하다</a:t>
-            </a:r>
-            <a:r>
-              <a:rPr lang="en-US" altLang="ko-KR" dirty="0"/>
-              <a:t>.</a:t>
-            </a:r>
-          </a:p>
-          <a:p>
-            <a:endParaRPr lang="en-US" altLang="ko-KR" dirty="0"/>
-          </a:p>
-          <a:p>
-            <a:r>
-              <a:rPr lang="en-US" altLang="ko-KR" dirty="0"/>
-              <a:t>Gradient Vanishing</a:t>
-            </a:r>
-          </a:p>
-          <a:p>
-            <a:pPr lvl="1"/>
-            <a:r>
-              <a:rPr lang="ko-KR" altLang="en-US" dirty="0"/>
-              <a:t>이전 레이어로 전파되는 </a:t>
-            </a:r>
-            <a:r>
-              <a:rPr lang="ko-KR" altLang="en-US" dirty="0" err="1"/>
-              <a:t>그라디언트가</a:t>
-            </a:r>
-            <a:r>
-              <a:rPr lang="ko-KR" altLang="en-US" dirty="0"/>
-              <a:t> </a:t>
-            </a:r>
-            <a:r>
-              <a:rPr lang="en-US" altLang="ko-KR" dirty="0"/>
-              <a:t>0</a:t>
-            </a:r>
-            <a:r>
-              <a:rPr lang="ko-KR" altLang="en-US" dirty="0"/>
-              <a:t>에 가까워지는 현상</a:t>
-            </a:r>
-            <a:r>
-              <a:rPr lang="en-US" altLang="ko-KR" dirty="0"/>
-              <a:t>.</a:t>
-            </a:r>
-          </a:p>
-          <a:p>
-            <a:pPr lvl="1"/>
-            <a:r>
-              <a:rPr lang="ko-KR" altLang="en-US" dirty="0"/>
-              <a:t>양 극단의 </a:t>
-            </a:r>
-            <a:r>
-              <a:rPr lang="ko-KR" altLang="en-US" dirty="0" err="1"/>
-              <a:t>미분값이</a:t>
-            </a:r>
-            <a:r>
-              <a:rPr lang="ko-KR" altLang="en-US" dirty="0"/>
-              <a:t> </a:t>
-            </a:r>
-            <a:r>
-              <a:rPr lang="en-US" altLang="ko-KR" dirty="0"/>
-              <a:t>0</a:t>
-            </a:r>
-            <a:r>
-              <a:rPr lang="ko-KR" altLang="en-US" dirty="0"/>
-              <a:t>에 가깝기 때문에 발생</a:t>
-            </a:r>
-            <a:r>
-              <a:rPr lang="en-US" altLang="ko-KR" dirty="0"/>
-              <a:t>.</a:t>
-            </a:r>
-          </a:p>
-          <a:p>
-            <a:pPr lvl="1"/>
-            <a:r>
-              <a:rPr lang="ko-KR" altLang="en-US" dirty="0"/>
-              <a:t>레이어를 깊게 쌓으면 파라미터의 업데이트가 제대로 이루어지지 않음</a:t>
-            </a:r>
-            <a:r>
-              <a:rPr lang="en-US" altLang="ko-KR" dirty="0"/>
-              <a:t>.</a:t>
-            </a:r>
-          </a:p>
-          <a:p>
-            <a:pPr lvl="1"/>
-            <a:r>
-              <a:rPr lang="ko-KR" altLang="en-US" dirty="0"/>
-              <a:t>극복 </a:t>
-            </a:r>
-            <a:r>
-              <a:rPr lang="en-US" altLang="ko-KR" dirty="0"/>
-              <a:t>-&gt; </a:t>
-            </a:r>
-            <a:r>
-              <a:rPr lang="en-US" altLang="ko-KR" dirty="0" err="1"/>
-              <a:t>ReLU</a:t>
-            </a:r>
-            <a:endParaRPr lang="en-US" altLang="ko-KR" dirty="0"/>
-          </a:p>
-          <a:p>
-            <a:pPr lvl="1"/>
-            <a:r>
-              <a:rPr lang="ko-KR" altLang="en-US" dirty="0"/>
-              <a:t>극복 </a:t>
-            </a:r>
-            <a:r>
-              <a:rPr lang="en-US" altLang="ko-KR" dirty="0"/>
-              <a:t>-&gt; </a:t>
-            </a:r>
-            <a:r>
-              <a:rPr lang="ko-KR" altLang="en-US" dirty="0"/>
-              <a:t>초기화를 잘해주면</a:t>
-            </a:r>
-            <a:r>
-              <a:rPr lang="en-US" altLang="ko-KR" dirty="0"/>
-              <a:t>…</a:t>
-            </a:r>
-          </a:p>
-        </p:txBody>
-      </p:sp>
-    </p:spTree>
-    <p:extLst>
-      <p:ext uri="{BB962C8B-B14F-4D97-AF65-F5344CB8AC3E}">
-        <p14:creationId xmlns:p14="http://schemas.microsoft.com/office/powerpoint/2010/main" val="515226440"/>
-      </p:ext>
-    </p:extLst>
-  </p:cSld>
-  <p:clrMapOvr>
-    <a:masterClrMapping/>
-  </p:clrMapOvr>
-</p:sld>
-</file>
-
 <file path=ppt/slides/slide24.xml><?xml version="1.0" encoding="utf-8"?>
 <p:sld xmlns:a="http://schemas.openxmlformats.org/drawingml/2006/main" xmlns:r="http://schemas.openxmlformats.org/officeDocument/2006/relationships" xmlns:p="http://schemas.openxmlformats.org/presentationml/2006/main">
   <p:cSld>
@@ -12143,18 +11959,249 @@
           <a:p>
             <a:r>
               <a:rPr lang="en-US" altLang="ko-KR" dirty="0"/>
-              <a:t>Activation function – </a:t>
+              <a:t>Activation function – sigmoid(2)</a:t>
+            </a:r>
+            <a:endParaRPr lang="ko-KR" altLang="en-US" dirty="0"/>
+          </a:p>
+        </p:txBody>
+      </p:sp>
+      <p:sp>
+        <p:nvSpPr>
+          <p:cNvPr id="3" name="내용 개체 틀 2">
+            <a:extLst>
+              <a:ext uri="{FF2B5EF4-FFF2-40B4-BE49-F238E27FC236}">
+                <a16:creationId xmlns:a16="http://schemas.microsoft.com/office/drawing/2014/main" id="{D944618D-A2BB-4041-844C-992E1D546D87}"/>
+              </a:ext>
+            </a:extLst>
+          </p:cNvPr>
+          <p:cNvSpPr>
+            <a:spLocks noGrp="1"/>
+          </p:cNvSpPr>
+          <p:nvPr>
+            <p:ph idx="1"/>
+          </p:nvPr>
+        </p:nvSpPr>
+        <p:spPr>
+          <a:xfrm>
+            <a:off x="1097280" y="1845734"/>
+            <a:ext cx="10058400" cy="4023360"/>
+          </a:xfrm>
+        </p:spPr>
+        <p:txBody>
+          <a:bodyPr/>
+          <a:lstStyle/>
+          <a:p>
+            <a:r>
+              <a:rPr lang="en-US" altLang="ko-KR" dirty="0"/>
+              <a:t>Gradient Vanishing (</a:t>
+            </a:r>
+            <a:r>
+              <a:rPr lang="ko-KR" altLang="en-US" dirty="0" err="1"/>
+              <a:t>그라디언트가</a:t>
+            </a:r>
+            <a:r>
+              <a:rPr lang="ko-KR" altLang="en-US" dirty="0"/>
+              <a:t> 죽는 현상 </a:t>
+            </a:r>
+            <a:r>
+              <a:rPr lang="en-US" altLang="ko-KR" dirty="0"/>
+              <a:t>-&gt; </a:t>
+            </a:r>
+            <a:r>
+              <a:rPr lang="ko-KR" altLang="en-US" dirty="0"/>
+              <a:t>학습이 되지 않는다</a:t>
+            </a:r>
+            <a:r>
+              <a:rPr lang="en-US" altLang="ko-KR" dirty="0"/>
+              <a:t>)</a:t>
+            </a:r>
+          </a:p>
+          <a:p>
+            <a:r>
+              <a:rPr lang="ko-KR" altLang="en-US" dirty="0"/>
+              <a:t>지수함수라서 계산이 복잡하다</a:t>
+            </a:r>
+            <a:r>
+              <a:rPr lang="en-US" altLang="ko-KR" dirty="0"/>
+              <a:t>.</a:t>
+            </a:r>
+          </a:p>
+          <a:p>
+            <a:endParaRPr lang="en-US" altLang="ko-KR" dirty="0"/>
+          </a:p>
+          <a:p>
+            <a:r>
+              <a:rPr lang="en-US" altLang="ko-KR" dirty="0"/>
+              <a:t>Gradient Vanishing</a:t>
+            </a:r>
+          </a:p>
+          <a:p>
+            <a:pPr lvl="1"/>
+            <a:r>
+              <a:rPr lang="ko-KR" altLang="en-US" dirty="0"/>
+              <a:t>이전 레이어로 전파되는 </a:t>
+            </a:r>
+            <a:r>
+              <a:rPr lang="ko-KR" altLang="en-US" dirty="0" err="1"/>
+              <a:t>그라디언트가</a:t>
+            </a:r>
+            <a:r>
+              <a:rPr lang="ko-KR" altLang="en-US" dirty="0"/>
+              <a:t> </a:t>
+            </a:r>
+            <a:r>
+              <a:rPr lang="en-US" altLang="ko-KR" dirty="0"/>
+              <a:t>0</a:t>
+            </a:r>
+            <a:r>
+              <a:rPr lang="ko-KR" altLang="en-US" dirty="0"/>
+              <a:t>에 가까워지는 현상</a:t>
+            </a:r>
+            <a:r>
+              <a:rPr lang="en-US" altLang="ko-KR" dirty="0"/>
+              <a:t>.</a:t>
+            </a:r>
+          </a:p>
+          <a:p>
+            <a:pPr lvl="1"/>
+            <a:r>
+              <a:rPr lang="ko-KR" altLang="en-US" dirty="0"/>
+              <a:t>양 극단의 </a:t>
+            </a:r>
+            <a:r>
+              <a:rPr lang="ko-KR" altLang="en-US" dirty="0" err="1"/>
+              <a:t>미분값이</a:t>
+            </a:r>
+            <a:r>
+              <a:rPr lang="ko-KR" altLang="en-US" dirty="0"/>
+              <a:t> </a:t>
+            </a:r>
+            <a:r>
+              <a:rPr lang="en-US" altLang="ko-KR" dirty="0"/>
+              <a:t>0</a:t>
+            </a:r>
+            <a:r>
+              <a:rPr lang="ko-KR" altLang="en-US" dirty="0"/>
+              <a:t>에 가깝기 때문에 발생</a:t>
+            </a:r>
+            <a:r>
+              <a:rPr lang="en-US" altLang="ko-KR" dirty="0"/>
+              <a:t>.</a:t>
+            </a:r>
+          </a:p>
+          <a:p>
+            <a:pPr lvl="1"/>
+            <a:r>
+              <a:rPr lang="ko-KR" altLang="en-US" dirty="0"/>
+              <a:t>레이어를 깊게 쌓으면 파라미터의 업데이트가 제대로 이루어지지 않음</a:t>
+            </a:r>
+            <a:r>
+              <a:rPr lang="en-US" altLang="ko-KR" dirty="0"/>
+              <a:t>.</a:t>
+            </a:r>
+          </a:p>
+          <a:p>
+            <a:pPr lvl="1"/>
+            <a:r>
+              <a:rPr lang="ko-KR" altLang="en-US" dirty="0"/>
+              <a:t>극복 </a:t>
+            </a:r>
+            <a:r>
+              <a:rPr lang="en-US" altLang="ko-KR" dirty="0"/>
+              <a:t>-&gt; </a:t>
             </a:r>
             <a:r>
               <a:rPr lang="en-US" altLang="ko-KR" dirty="0" err="1"/>
               <a:t>ReLU</a:t>
             </a:r>
-            <a:endParaRPr lang="ko-KR" altLang="en-US" dirty="0"/>
+            <a:endParaRPr lang="en-US" altLang="ko-KR" dirty="0"/>
+          </a:p>
+          <a:p>
+            <a:pPr lvl="1"/>
+            <a:r>
+              <a:rPr lang="ko-KR" altLang="en-US" dirty="0"/>
+              <a:t>극복 </a:t>
+            </a:r>
+            <a:r>
+              <a:rPr lang="en-US" altLang="ko-KR" dirty="0"/>
+              <a:t>-&gt; </a:t>
+            </a:r>
+            <a:r>
+              <a:rPr lang="ko-KR" altLang="en-US" dirty="0"/>
+              <a:t>초기화를 잘해주면</a:t>
+            </a:r>
+            <a:r>
+              <a:rPr lang="en-US" altLang="ko-KR" dirty="0"/>
+              <a:t>…</a:t>
+            </a:r>
           </a:p>
         </p:txBody>
       </p:sp>
-      <mc:AlternateContent xmlns:mc="http://schemas.openxmlformats.org/markup-compatibility/2006">
-        <mc:Choice xmlns:a14="http://schemas.microsoft.com/office/drawing/2010/main" Requires="a14">
+    </p:spTree>
+    <p:extLst>
+      <p:ext uri="{BB962C8B-B14F-4D97-AF65-F5344CB8AC3E}">
+        <p14:creationId xmlns:p14="http://schemas.microsoft.com/office/powerpoint/2010/main" val="515226440"/>
+      </p:ext>
+    </p:extLst>
+  </p:cSld>
+  <p:clrMapOvr>
+    <a:masterClrMapping/>
+  </p:clrMapOvr>
+</p:sld>
+</file>
+
+<file path=ppt/slides/slide25.xml><?xml version="1.0" encoding="utf-8"?>
+<p:sld xmlns:a="http://schemas.openxmlformats.org/drawingml/2006/main" xmlns:r="http://schemas.openxmlformats.org/officeDocument/2006/relationships" xmlns:p="http://schemas.openxmlformats.org/presentationml/2006/main">
+  <p:cSld>
+    <p:spTree>
+      <p:nvGrpSpPr>
+        <p:cNvPr id="1" name=""/>
+        <p:cNvGrpSpPr/>
+        <p:nvPr/>
+      </p:nvGrpSpPr>
+      <p:grpSpPr>
+        <a:xfrm>
+          <a:off x="0" y="0"/>
+          <a:ext cx="0" cy="0"/>
+          <a:chOff x="0" y="0"/>
+          <a:chExt cx="0" cy="0"/>
+        </a:xfrm>
+      </p:grpSpPr>
+      <p:sp>
+        <p:nvSpPr>
+          <p:cNvPr id="2" name="제목 1">
+            <a:extLst>
+              <a:ext uri="{FF2B5EF4-FFF2-40B4-BE49-F238E27FC236}">
+                <a16:creationId xmlns:a16="http://schemas.microsoft.com/office/drawing/2014/main" id="{6DF80702-750D-44FC-9252-1AC96CA45019}"/>
+              </a:ext>
+            </a:extLst>
+          </p:cNvPr>
+          <p:cNvSpPr>
+            <a:spLocks noGrp="1"/>
+          </p:cNvSpPr>
+          <p:nvPr>
+            <p:ph type="title"/>
+          </p:nvPr>
+        </p:nvSpPr>
+        <p:spPr/>
+        <p:txBody>
+          <a:bodyPr/>
+          <a:lstStyle/>
+          <a:p>
+            <a:r>
+              <a:rPr lang="en-US" altLang="ko-KR" dirty="0"/>
+              <a:t>Activation function – </a:t>
+            </a:r>
+            <a:r>
+              <a:rPr lang="en-US" altLang="ko-KR" dirty="0" err="1"/>
+              <a:t>ReLU</a:t>
+            </a:r>
+            <a:endParaRPr lang="ko-KR" altLang="en-US" dirty="0"/>
+          </a:p>
+        </p:txBody>
+      </p:sp>
+      <mc:AlternateContent xmlns:mc="http://schemas.openxmlformats.org/markup-compatibility/2006" xmlns:a14="http://schemas.microsoft.com/office/drawing/2010/main">
+        <mc:Choice Requires="a14">
           <p:sp>
             <p:nvSpPr>
               <p:cNvPr id="3" name="내용 개체 틀 2">
@@ -12251,13 +12298,7 @@
                               <a:rPr lang="en-US" altLang="ko-KR" i="1">
                                 <a:latin typeface="Cambria Math" panose="02040503050406030204" pitchFamily="18" charset="0"/>
                               </a:rPr>
-                              <m:t>≥</m:t>
-                            </m:r>
-                            <m:r>
-                              <a:rPr lang="en-US" altLang="ko-KR" i="1">
-                                <a:latin typeface="Cambria Math" panose="02040503050406030204" pitchFamily="18" charset="0"/>
-                              </a:rPr>
-                              <m:t>0     </m:t>
+                              <m:t>≥0     </m:t>
                             </m:r>
                           </m:e>
                           <m:e>
@@ -12416,7 +12457,7 @@
             </p:txBody>
           </p:sp>
         </mc:Choice>
-        <mc:Fallback>
+        <mc:Fallback xmlns="">
           <p:sp>
             <p:nvSpPr>
               <p:cNvPr id="3" name="내용 개체 틀 2">
@@ -12516,7 +12557,7 @@
 </p:sld>
 </file>
 
-<file path=ppt/slides/slide25.xml><?xml version="1.0" encoding="utf-8"?>
+<file path=ppt/slides/slide26.xml><?xml version="1.0" encoding="utf-8"?>
 <p:sld xmlns:a="http://schemas.openxmlformats.org/drawingml/2006/main" xmlns:r="http://schemas.openxmlformats.org/officeDocument/2006/relationships" xmlns:p="http://schemas.openxmlformats.org/presentationml/2006/main">
   <p:cSld>
     <p:spTree>
@@ -12566,8 +12607,8 @@
           </a:p>
         </p:txBody>
       </p:sp>
-      <mc:AlternateContent xmlns:mc="http://schemas.openxmlformats.org/markup-compatibility/2006">
-        <mc:Choice xmlns:a14="http://schemas.microsoft.com/office/drawing/2010/main" Requires="a14">
+      <mc:AlternateContent xmlns:mc="http://schemas.openxmlformats.org/markup-compatibility/2006" xmlns:a14="http://schemas.microsoft.com/office/drawing/2010/main">
+        <mc:Choice Requires="a14">
           <p:sp>
             <p:nvSpPr>
               <p:cNvPr id="3" name="내용 개체 틀 2">
@@ -12786,7 +12827,7 @@
             </p:txBody>
           </p:sp>
         </mc:Choice>
-        <mc:Fallback>
+        <mc:Fallback xmlns="">
           <p:sp>
             <p:nvSpPr>
               <p:cNvPr id="3" name="내용 개체 틀 2">
@@ -12886,7 +12927,7 @@
 </p:sld>
 </file>
 
-<file path=ppt/slides/slide26.xml><?xml version="1.0" encoding="utf-8"?>
+<file path=ppt/slides/slide27.xml><?xml version="1.0" encoding="utf-8"?>
 <p:sld xmlns:a="http://schemas.openxmlformats.org/drawingml/2006/main" xmlns:r="http://schemas.openxmlformats.org/officeDocument/2006/relationships" xmlns:p="http://schemas.openxmlformats.org/presentationml/2006/main">
   <p:cSld>
     <p:spTree>
@@ -12936,8 +12977,8 @@
           </a:p>
         </p:txBody>
       </p:sp>
-      <mc:AlternateContent xmlns:mc="http://schemas.openxmlformats.org/markup-compatibility/2006">
-        <mc:Choice xmlns:a14="http://schemas.microsoft.com/office/drawing/2010/main" Requires="a14">
+      <mc:AlternateContent xmlns:mc="http://schemas.openxmlformats.org/markup-compatibility/2006" xmlns:a14="http://schemas.microsoft.com/office/drawing/2010/main">
+        <mc:Choice Requires="a14">
           <p:sp>
             <p:nvSpPr>
               <p:cNvPr id="3" name="내용 개체 틀 2">
@@ -13282,7 +13323,7 @@
             </p:txBody>
           </p:sp>
         </mc:Choice>
-        <mc:Fallback>
+        <mc:Fallback xmlns="">
           <p:sp>
             <p:nvSpPr>
               <p:cNvPr id="3" name="내용 개체 틀 2">
@@ -13335,7 +13376,7 @@
 </p:sld>
 </file>
 
-<file path=ppt/slides/slide27.xml><?xml version="1.0" encoding="utf-8"?>
+<file path=ppt/slides/slide28.xml><?xml version="1.0" encoding="utf-8"?>
 <p:sld xmlns:a="http://schemas.openxmlformats.org/drawingml/2006/main" xmlns:r="http://schemas.openxmlformats.org/officeDocument/2006/relationships" xmlns:p="http://schemas.openxmlformats.org/presentationml/2006/main">
   <p:cSld>
     <p:spTree>
@@ -13357,7 +13398,7 @@
           <p:cNvPr id="2" name="제목 1">
             <a:extLst>
               <a:ext uri="{FF2B5EF4-FFF2-40B4-BE49-F238E27FC236}">
-                <a16:creationId xmlns:a16="http://schemas.microsoft.com/office/drawing/2014/main" id="{1FADEE26-0999-4C2D-A890-9669CCE08469}"/>
+                <a16:creationId xmlns:a16="http://schemas.microsoft.com/office/drawing/2014/main" id="{4CDE9AA6-3B4E-4B18-9447-FEA094035DA6}"/>
               </a:ext>
             </a:extLst>
           </p:cNvPr>
@@ -13374,51 +13415,46 @@
           <a:lstStyle/>
           <a:p>
             <a:r>
-              <a:rPr lang="ko-KR" altLang="en-US" dirty="0"/>
-              <a:t>예시 </a:t>
-            </a:r>
-            <a:r>
               <a:rPr lang="en-US" altLang="ko-KR" dirty="0"/>
-              <a:t>- XOR</a:t>
+              <a:t>Loss Function</a:t>
             </a:r>
             <a:endParaRPr lang="ko-KR" altLang="en-US" dirty="0"/>
           </a:p>
         </p:txBody>
       </p:sp>
-      <p:pic>
-        <p:nvPicPr>
-          <p:cNvPr id="5" name="그림 4" descr="화면 캡처">
+      <p:sp>
+        <p:nvSpPr>
+          <p:cNvPr id="3" name="내용 개체 틀 2">
             <a:extLst>
               <a:ext uri="{FF2B5EF4-FFF2-40B4-BE49-F238E27FC236}">
-                <a16:creationId xmlns:a16="http://schemas.microsoft.com/office/drawing/2014/main" id="{84FCB8A6-456F-4CEC-AF3D-DAC5E264A9ED}"/>
+                <a16:creationId xmlns:a16="http://schemas.microsoft.com/office/drawing/2014/main" id="{B84900A4-5593-4AC5-ACC8-9B29E31B6F24}"/>
               </a:ext>
             </a:extLst>
           </p:cNvPr>
-          <p:cNvPicPr>
-            <a:picLocks noChangeAspect="1"/>
-          </p:cNvPicPr>
-          <p:nvPr/>
-        </p:nvPicPr>
-        <p:blipFill>
-          <a:blip r:embed="rId2"/>
-          <a:stretch>
-            <a:fillRect/>
-          </a:stretch>
-        </p:blipFill>
-        <p:spPr>
-          <a:xfrm>
-            <a:off x="1214284" y="1845734"/>
-            <a:ext cx="4397335" cy="4314579"/>
-          </a:xfrm>
-          <a:prstGeom prst="rect">
-            <a:avLst/>
-          </a:prstGeom>
-        </p:spPr>
-      </p:pic>
+          <p:cNvSpPr>
+            <a:spLocks noGrp="1"/>
+          </p:cNvSpPr>
+          <p:nvPr>
+            <p:ph idx="1"/>
+          </p:nvPr>
+        </p:nvSpPr>
+        <p:spPr/>
+        <p:txBody>
+          <a:bodyPr/>
+          <a:lstStyle/>
+          <a:p>
+            <a:r>
+              <a:rPr lang="en-US" altLang="ko-KR" dirty="0"/>
+              <a:t>To be updated</a:t>
+            </a:r>
+            <a:endParaRPr lang="ko-KR" altLang="en-US" dirty="0"/>
+          </a:p>
+        </p:txBody>
+      </p:sp>
     </p:spTree>
     <p:extLst>
       <p:ext uri="{BB962C8B-B14F-4D97-AF65-F5344CB8AC3E}">
-        <p14:creationId xmlns:p14="http://schemas.microsoft.com/office/powerpoint/2010/main" val="2170169537"/>
+        <p14:creationId xmlns:p14="http://schemas.microsoft.com/office/powerpoint/2010/main" val="2853798612"/>
       </p:ext>
     </p:extLst>
   </p:cSld>
@@ -13428,7 +13464,7 @@
 </p:sld>
 </file>
 
-<file path=ppt/slides/slide28.xml><?xml version="1.0" encoding="utf-8"?>
+<file path=ppt/slides/slide29.xml><?xml version="1.0" encoding="utf-8"?>
 <p:sld xmlns:a="http://schemas.openxmlformats.org/drawingml/2006/main" xmlns:r="http://schemas.openxmlformats.org/officeDocument/2006/relationships" xmlns:p="http://schemas.openxmlformats.org/presentationml/2006/main">
   <p:cSld>
     <p:spTree>
@@ -13534,6 +13570,84 @@
           </a:extLst>
         </p:spPr>
       </p:pic>
+      <p:sp>
+        <p:nvSpPr>
+          <p:cNvPr id="4" name="내용 개체 틀 2">
+            <a:extLst>
+              <a:ext uri="{FF2B5EF4-FFF2-40B4-BE49-F238E27FC236}">
+                <a16:creationId xmlns:a16="http://schemas.microsoft.com/office/drawing/2014/main" id="{4CC1C456-A97C-4C38-A030-883F3D3F3321}"/>
+              </a:ext>
+            </a:extLst>
+          </p:cNvPr>
+          <p:cNvSpPr>
+            <a:spLocks noGrp="1"/>
+          </p:cNvSpPr>
+          <p:nvPr>
+            <p:ph idx="1"/>
+          </p:nvPr>
+        </p:nvSpPr>
+        <p:spPr>
+          <a:xfrm>
+            <a:off x="1097280" y="1845734"/>
+            <a:ext cx="10058400" cy="4023360"/>
+          </a:xfrm>
+        </p:spPr>
+        <p:txBody>
+          <a:bodyPr>
+            <a:normAutofit/>
+          </a:bodyPr>
+          <a:lstStyle/>
+          <a:p>
+            <a:r>
+              <a:rPr lang="en-US" altLang="ko-KR" dirty="0"/>
+              <a:t>Gradient Descent</a:t>
+            </a:r>
+          </a:p>
+          <a:p>
+            <a:r>
+              <a:rPr lang="en-US" altLang="ko-KR" dirty="0"/>
+              <a:t>Stochastic Gradient Descent</a:t>
+            </a:r>
+          </a:p>
+          <a:p>
+            <a:r>
+              <a:rPr lang="en-US" altLang="ko-KR" dirty="0"/>
+              <a:t>Momentum</a:t>
+            </a:r>
+          </a:p>
+          <a:p>
+            <a:r>
+              <a:rPr lang="en-US" altLang="ko-KR" dirty="0" err="1"/>
+              <a:t>Nesterov</a:t>
+            </a:r>
+            <a:r>
+              <a:rPr lang="en-US" altLang="ko-KR" dirty="0"/>
+              <a:t> Accelerated Gradient</a:t>
+            </a:r>
+          </a:p>
+          <a:p>
+            <a:r>
+              <a:rPr lang="en-US" altLang="ko-KR" dirty="0" err="1"/>
+              <a:t>AdaGrad</a:t>
+            </a:r>
+            <a:endParaRPr lang="en-US" altLang="ko-KR" dirty="0"/>
+          </a:p>
+          <a:p>
+            <a:r>
+              <a:rPr lang="en-US" altLang="ko-KR" dirty="0" err="1"/>
+              <a:t>RMSProp</a:t>
+            </a:r>
+            <a:endParaRPr lang="en-US" altLang="ko-KR" dirty="0"/>
+          </a:p>
+          <a:p>
+            <a:r>
+              <a:rPr lang="en-US" altLang="ko-KR" dirty="0"/>
+              <a:t>Adam</a:t>
+            </a:r>
+            <a:endParaRPr lang="ko-KR" altLang="en-US" dirty="0"/>
+          </a:p>
+        </p:txBody>
+      </p:sp>
     </p:spTree>
     <p:extLst>
       <p:ext uri="{BB962C8B-B14F-4D97-AF65-F5344CB8AC3E}">
@@ -13547,466 +13661,7 @@
 </p:sld>
 </file>
 
-<file path=ppt/slides/slide29.xml><?xml version="1.0" encoding="utf-8"?>
-<p:sld xmlns:a="http://schemas.openxmlformats.org/drawingml/2006/main" xmlns:r="http://schemas.openxmlformats.org/officeDocument/2006/relationships" xmlns:p="http://schemas.openxmlformats.org/presentationml/2006/main">
-  <p:cSld>
-    <p:spTree>
-      <p:nvGrpSpPr>
-        <p:cNvPr id="1" name=""/>
-        <p:cNvGrpSpPr/>
-        <p:nvPr/>
-      </p:nvGrpSpPr>
-      <p:grpSpPr>
-        <a:xfrm>
-          <a:off x="0" y="0"/>
-          <a:ext cx="0" cy="0"/>
-          <a:chOff x="0" y="0"/>
-          <a:chExt cx="0" cy="0"/>
-        </a:xfrm>
-      </p:grpSpPr>
-      <p:sp>
-        <p:nvSpPr>
-          <p:cNvPr id="2" name="제목 1">
-            <a:extLst>
-              <a:ext uri="{FF2B5EF4-FFF2-40B4-BE49-F238E27FC236}">
-                <a16:creationId xmlns:a16="http://schemas.microsoft.com/office/drawing/2014/main" id="{67278C35-DBEC-42E9-A1DE-838447B9C588}"/>
-              </a:ext>
-            </a:extLst>
-          </p:cNvPr>
-          <p:cNvSpPr>
-            <a:spLocks noGrp="1"/>
-          </p:cNvSpPr>
-          <p:nvPr>
-            <p:ph type="title"/>
-          </p:nvPr>
-        </p:nvSpPr>
-        <p:spPr/>
-        <p:txBody>
-          <a:bodyPr/>
-          <a:lstStyle/>
-          <a:p>
-            <a:r>
-              <a:rPr lang="en-US" altLang="ko-KR" dirty="0"/>
-              <a:t>Feed Forward neural network?</a:t>
-            </a:r>
-            <a:endParaRPr lang="ko-KR" altLang="en-US" dirty="0"/>
-          </a:p>
-        </p:txBody>
-      </p:sp>
-      <p:sp>
-        <p:nvSpPr>
-          <p:cNvPr id="3" name="내용 개체 틀 2">
-            <a:extLst>
-              <a:ext uri="{FF2B5EF4-FFF2-40B4-BE49-F238E27FC236}">
-                <a16:creationId xmlns:a16="http://schemas.microsoft.com/office/drawing/2014/main" id="{851004CC-E0DB-4FD8-91C3-DD38DA297004}"/>
-              </a:ext>
-            </a:extLst>
-          </p:cNvPr>
-          <p:cNvSpPr>
-            <a:spLocks noGrp="1"/>
-          </p:cNvSpPr>
-          <p:nvPr>
-            <p:ph idx="1"/>
-          </p:nvPr>
-        </p:nvSpPr>
-        <p:spPr/>
-        <p:txBody>
-          <a:bodyPr/>
-          <a:lstStyle/>
-          <a:p>
-            <a:r>
-              <a:rPr lang="ko-KR" altLang="en-US" dirty="0"/>
-              <a:t>설명</a:t>
-            </a:r>
-            <a:endParaRPr lang="en-US" altLang="ko-KR" dirty="0"/>
-          </a:p>
-          <a:p>
-            <a:r>
-              <a:rPr lang="ko-KR" altLang="en-US" dirty="0"/>
-              <a:t>개념적으로</a:t>
-            </a:r>
-            <a:endParaRPr lang="en-US" altLang="ko-KR" dirty="0"/>
-          </a:p>
-          <a:p>
-            <a:r>
-              <a:rPr lang="ko-KR" altLang="en-US" dirty="0"/>
-              <a:t>그림 그려가며</a:t>
-            </a:r>
-          </a:p>
-        </p:txBody>
-      </p:sp>
-    </p:spTree>
-    <p:extLst>
-      <p:ext uri="{BB962C8B-B14F-4D97-AF65-F5344CB8AC3E}">
-        <p14:creationId xmlns:p14="http://schemas.microsoft.com/office/powerpoint/2010/main" val="3020366197"/>
-      </p:ext>
-    </p:extLst>
-  </p:cSld>
-  <p:clrMapOvr>
-    <a:masterClrMapping/>
-  </p:clrMapOvr>
-</p:sld>
-</file>
-
 <file path=ppt/slides/slide3.xml><?xml version="1.0" encoding="utf-8"?>
-<p:sld xmlns:a="http://schemas.openxmlformats.org/drawingml/2006/main" xmlns:r="http://schemas.openxmlformats.org/officeDocument/2006/relationships" xmlns:p="http://schemas.openxmlformats.org/presentationml/2006/main">
-  <p:cSld>
-    <p:spTree>
-      <p:nvGrpSpPr>
-        <p:cNvPr id="1" name=""/>
-        <p:cNvGrpSpPr/>
-        <p:nvPr/>
-      </p:nvGrpSpPr>
-      <p:grpSpPr>
-        <a:xfrm>
-          <a:off x="0" y="0"/>
-          <a:ext cx="0" cy="0"/>
-          <a:chOff x="0" y="0"/>
-          <a:chExt cx="0" cy="0"/>
-        </a:xfrm>
-      </p:grpSpPr>
-      <p:sp>
-        <p:nvSpPr>
-          <p:cNvPr id="2" name="제목 1">
-            <a:extLst>
-              <a:ext uri="{FF2B5EF4-FFF2-40B4-BE49-F238E27FC236}">
-                <a16:creationId xmlns:a16="http://schemas.microsoft.com/office/drawing/2014/main" id="{45857430-E857-434D-92B7-DA6EAACF35B9}"/>
-              </a:ext>
-            </a:extLst>
-          </p:cNvPr>
-          <p:cNvSpPr>
-            <a:spLocks noGrp="1"/>
-          </p:cNvSpPr>
-          <p:nvPr>
-            <p:ph type="title"/>
-          </p:nvPr>
-        </p:nvSpPr>
-        <p:spPr/>
-        <p:txBody>
-          <a:bodyPr/>
-          <a:lstStyle/>
-          <a:p>
-            <a:r>
-              <a:rPr lang="ko-KR" altLang="en-US" dirty="0"/>
-              <a:t>학습 </a:t>
-            </a:r>
-            <a:r>
-              <a:rPr lang="en-US" altLang="ko-KR" dirty="0"/>
-              <a:t>– Delta Rule</a:t>
-            </a:r>
-            <a:endParaRPr lang="ko-KR" altLang="en-US" dirty="0"/>
-          </a:p>
-        </p:txBody>
-      </p:sp>
-      <p:sp>
-        <p:nvSpPr>
-          <p:cNvPr id="3" name="내용 개체 틀 2">
-            <a:extLst>
-              <a:ext uri="{FF2B5EF4-FFF2-40B4-BE49-F238E27FC236}">
-                <a16:creationId xmlns:a16="http://schemas.microsoft.com/office/drawing/2014/main" id="{CE8D67FF-2422-4C3C-A238-DFF719FDC356}"/>
-              </a:ext>
-            </a:extLst>
-          </p:cNvPr>
-          <p:cNvSpPr>
-            <a:spLocks noGrp="1"/>
-          </p:cNvSpPr>
-          <p:nvPr>
-            <p:ph idx="1"/>
-          </p:nvPr>
-        </p:nvSpPr>
-        <p:spPr/>
-        <p:txBody>
-          <a:bodyPr/>
-          <a:lstStyle/>
-          <a:p>
-            <a:r>
-              <a:rPr lang="en-US" altLang="ko-KR" dirty="0"/>
-              <a:t>W(</a:t>
-            </a:r>
-            <a:r>
-              <a:rPr lang="ko-KR" altLang="en-US" dirty="0"/>
-              <a:t>가중치</a:t>
-            </a:r>
-            <a:r>
-              <a:rPr lang="en-US" altLang="ko-KR" dirty="0"/>
-              <a:t>)</a:t>
-            </a:r>
-            <a:r>
-              <a:rPr lang="ko-KR" altLang="en-US" dirty="0"/>
-              <a:t>와 </a:t>
-            </a:r>
-            <a:r>
-              <a:rPr lang="en-US" altLang="ko-KR" dirty="0"/>
-              <a:t>b(</a:t>
-            </a:r>
-            <a:r>
-              <a:rPr lang="ko-KR" altLang="en-US" dirty="0"/>
-              <a:t>바이어스</a:t>
-            </a:r>
-            <a:r>
-              <a:rPr lang="en-US" altLang="ko-KR" dirty="0"/>
-              <a:t>)</a:t>
-            </a:r>
-            <a:r>
-              <a:rPr lang="ko-KR" altLang="en-US" dirty="0"/>
-              <a:t>를 임의의 값으로 초기화</a:t>
-            </a:r>
-            <a:endParaRPr lang="en-US" altLang="ko-KR" dirty="0"/>
-          </a:p>
-          <a:p>
-            <a:r>
-              <a:rPr lang="ko-KR" altLang="en-US" dirty="0"/>
-              <a:t>하나의 학습 벡터에 대한 출력 값 계산</a:t>
-            </a:r>
-            <a:endParaRPr lang="en-US" altLang="ko-KR" dirty="0"/>
-          </a:p>
-          <a:p>
-            <a:r>
-              <a:rPr lang="ko-KR" altLang="en-US" dirty="0"/>
-              <a:t>출력 값이 우리가 원하는 </a:t>
-            </a:r>
-            <a:r>
-              <a:rPr lang="ko-KR" altLang="en-US" dirty="0" err="1"/>
-              <a:t>목표값</a:t>
-            </a:r>
-            <a:r>
-              <a:rPr lang="en-US" altLang="ko-KR" dirty="0"/>
-              <a:t>(d)</a:t>
-            </a:r>
-            <a:r>
-              <a:rPr lang="ko-KR" altLang="en-US" dirty="0"/>
-              <a:t>과 가까워지도록 가중치를 </a:t>
-            </a:r>
-            <a:r>
-              <a:rPr lang="en-US" altLang="ko-KR" dirty="0"/>
-              <a:t>Gradient Descent</a:t>
-            </a:r>
-            <a:r>
-              <a:rPr lang="ko-KR" altLang="en-US" dirty="0"/>
-              <a:t>를 이용하여 조정</a:t>
-            </a:r>
-            <a:r>
-              <a:rPr lang="en-US" altLang="ko-KR" dirty="0"/>
-              <a:t>.</a:t>
-            </a:r>
-          </a:p>
-          <a:p>
-            <a:endParaRPr lang="en-US" altLang="ko-KR" dirty="0"/>
-          </a:p>
-          <a:p>
-            <a:endParaRPr lang="ko-KR" altLang="en-US" dirty="0"/>
-          </a:p>
-        </p:txBody>
-      </p:sp>
-    </p:spTree>
-    <p:extLst>
-      <p:ext uri="{BB962C8B-B14F-4D97-AF65-F5344CB8AC3E}">
-        <p14:creationId xmlns:p14="http://schemas.microsoft.com/office/powerpoint/2010/main" val="1385865745"/>
-      </p:ext>
-    </p:extLst>
-  </p:cSld>
-  <p:clrMapOvr>
-    <a:masterClrMapping/>
-  </p:clrMapOvr>
-</p:sld>
-</file>
-
-<file path=ppt/slides/slide30.xml><?xml version="1.0" encoding="utf-8"?>
-<p:sld xmlns:a="http://schemas.openxmlformats.org/drawingml/2006/main" xmlns:r="http://schemas.openxmlformats.org/officeDocument/2006/relationships" xmlns:p="http://schemas.openxmlformats.org/presentationml/2006/main">
-  <p:cSld>
-    <p:spTree>
-      <p:nvGrpSpPr>
-        <p:cNvPr id="1" name=""/>
-        <p:cNvGrpSpPr/>
-        <p:nvPr/>
-      </p:nvGrpSpPr>
-      <p:grpSpPr>
-        <a:xfrm>
-          <a:off x="0" y="0"/>
-          <a:ext cx="0" cy="0"/>
-          <a:chOff x="0" y="0"/>
-          <a:chExt cx="0" cy="0"/>
-        </a:xfrm>
-      </p:grpSpPr>
-      <p:sp>
-        <p:nvSpPr>
-          <p:cNvPr id="2" name="제목 1">
-            <a:extLst>
-              <a:ext uri="{FF2B5EF4-FFF2-40B4-BE49-F238E27FC236}">
-                <a16:creationId xmlns:a16="http://schemas.microsoft.com/office/drawing/2014/main" id="{2DA563D9-E1F5-4582-972A-0398E70260C2}"/>
-              </a:ext>
-            </a:extLst>
-          </p:cNvPr>
-          <p:cNvSpPr>
-            <a:spLocks noGrp="1"/>
-          </p:cNvSpPr>
-          <p:nvPr>
-            <p:ph type="title"/>
-          </p:nvPr>
-        </p:nvSpPr>
-        <p:spPr/>
-        <p:txBody>
-          <a:bodyPr/>
-          <a:lstStyle/>
-          <a:p>
-            <a:r>
-              <a:rPr lang="ko-KR" altLang="en-US" dirty="0"/>
-              <a:t>여러 기법 </a:t>
-            </a:r>
-            <a:r>
-              <a:rPr lang="en-US" altLang="ko-KR" dirty="0"/>
-              <a:t>ex dropout</a:t>
-            </a:r>
-            <a:endParaRPr lang="ko-KR" altLang="en-US" dirty="0"/>
-          </a:p>
-        </p:txBody>
-      </p:sp>
-      <p:sp>
-        <p:nvSpPr>
-          <p:cNvPr id="3" name="내용 개체 틀 2">
-            <a:extLst>
-              <a:ext uri="{FF2B5EF4-FFF2-40B4-BE49-F238E27FC236}">
-                <a16:creationId xmlns:a16="http://schemas.microsoft.com/office/drawing/2014/main" id="{6DA91EE2-FD7E-4BF8-BD02-4E9B2916C531}"/>
-              </a:ext>
-            </a:extLst>
-          </p:cNvPr>
-          <p:cNvSpPr>
-            <a:spLocks noGrp="1"/>
-          </p:cNvSpPr>
-          <p:nvPr>
-            <p:ph idx="1"/>
-          </p:nvPr>
-        </p:nvSpPr>
-        <p:spPr/>
-        <p:txBody>
-          <a:bodyPr/>
-          <a:lstStyle/>
-          <a:p>
-            <a:r>
-              <a:rPr lang="en-US" altLang="ko-KR" dirty="0" err="1"/>
-              <a:t>Minist</a:t>
-            </a:r>
-            <a:r>
-              <a:rPr lang="ko-KR" altLang="en-US" dirty="0"/>
-              <a:t> 향상 시키는 쪽으로 설명</a:t>
-            </a:r>
-            <a:endParaRPr lang="en-US" altLang="ko-KR" dirty="0"/>
-          </a:p>
-          <a:p>
-            <a:r>
-              <a:rPr lang="en-US" altLang="ko-KR" dirty="0"/>
-              <a:t>https://docs.google.com/presentation/d/1fuOqBNMLgUskKUzpEEDVPXrsByEGBpXW-zpHxyl-haY/edit#slide=id.g1ed84ee29f_0_0</a:t>
-            </a:r>
-            <a:endParaRPr lang="ko-KR" altLang="en-US" dirty="0"/>
-          </a:p>
-        </p:txBody>
-      </p:sp>
-    </p:spTree>
-    <p:extLst>
-      <p:ext uri="{BB962C8B-B14F-4D97-AF65-F5344CB8AC3E}">
-        <p14:creationId xmlns:p14="http://schemas.microsoft.com/office/powerpoint/2010/main" val="357180034"/>
-      </p:ext>
-    </p:extLst>
-  </p:cSld>
-  <p:clrMapOvr>
-    <a:masterClrMapping/>
-  </p:clrMapOvr>
-</p:sld>
-</file>
-
-<file path=ppt/slides/slide31.xml><?xml version="1.0" encoding="utf-8"?>
-<p:sld xmlns:a="http://schemas.openxmlformats.org/drawingml/2006/main" xmlns:r="http://schemas.openxmlformats.org/officeDocument/2006/relationships" xmlns:p="http://schemas.openxmlformats.org/presentationml/2006/main">
-  <p:cSld>
-    <p:spTree>
-      <p:nvGrpSpPr>
-        <p:cNvPr id="1" name=""/>
-        <p:cNvGrpSpPr/>
-        <p:nvPr/>
-      </p:nvGrpSpPr>
-      <p:grpSpPr>
-        <a:xfrm>
-          <a:off x="0" y="0"/>
-          <a:ext cx="0" cy="0"/>
-          <a:chOff x="0" y="0"/>
-          <a:chExt cx="0" cy="0"/>
-        </a:xfrm>
-      </p:grpSpPr>
-      <p:sp>
-        <p:nvSpPr>
-          <p:cNvPr id="2" name="제목 1">
-            <a:extLst>
-              <a:ext uri="{FF2B5EF4-FFF2-40B4-BE49-F238E27FC236}">
-                <a16:creationId xmlns:a16="http://schemas.microsoft.com/office/drawing/2014/main" id="{8674F636-0B63-43EC-8557-15BD68727D1F}"/>
-              </a:ext>
-            </a:extLst>
-          </p:cNvPr>
-          <p:cNvSpPr>
-            <a:spLocks noGrp="1"/>
-          </p:cNvSpPr>
-          <p:nvPr>
-            <p:ph type="title"/>
-          </p:nvPr>
-        </p:nvSpPr>
-        <p:spPr/>
-        <p:txBody>
-          <a:bodyPr/>
-          <a:lstStyle/>
-          <a:p>
-            <a:r>
-              <a:rPr lang="ko-KR" altLang="en-US" dirty="0"/>
-              <a:t>또 어디에</a:t>
-            </a:r>
-            <a:r>
-              <a:rPr lang="en-US" altLang="ko-KR" dirty="0"/>
-              <a:t>? </a:t>
-            </a:r>
-            <a:r>
-              <a:rPr lang="en-US" altLang="ko-KR" dirty="0" err="1"/>
-              <a:t>minist</a:t>
-            </a:r>
-            <a:endParaRPr lang="ko-KR" altLang="en-US" dirty="0"/>
-          </a:p>
-        </p:txBody>
-      </p:sp>
-      <p:sp>
-        <p:nvSpPr>
-          <p:cNvPr id="3" name="내용 개체 틀 2">
-            <a:extLst>
-              <a:ext uri="{FF2B5EF4-FFF2-40B4-BE49-F238E27FC236}">
-                <a16:creationId xmlns:a16="http://schemas.microsoft.com/office/drawing/2014/main" id="{29CE6F6F-E2B4-4D11-BE64-30F6514A8DA4}"/>
-              </a:ext>
-            </a:extLst>
-          </p:cNvPr>
-          <p:cNvSpPr>
-            <a:spLocks noGrp="1"/>
-          </p:cNvSpPr>
-          <p:nvPr>
-            <p:ph idx="1"/>
-          </p:nvPr>
-        </p:nvSpPr>
-        <p:spPr/>
-        <p:txBody>
-          <a:bodyPr/>
-          <a:lstStyle/>
-          <a:p>
-            <a:endParaRPr lang="ko-KR" altLang="en-US"/>
-          </a:p>
-        </p:txBody>
-      </p:sp>
-    </p:spTree>
-    <p:extLst>
-      <p:ext uri="{BB962C8B-B14F-4D97-AF65-F5344CB8AC3E}">
-        <p14:creationId xmlns:p14="http://schemas.microsoft.com/office/powerpoint/2010/main" val="4209023559"/>
-      </p:ext>
-    </p:extLst>
-  </p:cSld>
-  <p:clrMapOvr>
-    <a:masterClrMapping/>
-  </p:clrMapOvr>
-</p:sld>
-</file>
-
-<file path=ppt/slides/slide4.xml><?xml version="1.0" encoding="utf-8"?>
 <p:sld xmlns:a="http://schemas.openxmlformats.org/drawingml/2006/main" xmlns:r="http://schemas.openxmlformats.org/officeDocument/2006/relationships" xmlns:p="http://schemas.openxmlformats.org/presentationml/2006/main">
   <p:cSld>
     <p:spTree>
@@ -15051,7 +14706,1677 @@
 </p:sld>
 </file>
 
-<file path=ppt/slides/slide5.xml><?xml version="1.0" encoding="utf-8"?>
+<file path=ppt/slides/slide30.xml><?xml version="1.0" encoding="utf-8"?>
+<p:sld xmlns:a="http://schemas.openxmlformats.org/drawingml/2006/main" xmlns:r="http://schemas.openxmlformats.org/officeDocument/2006/relationships" xmlns:p="http://schemas.openxmlformats.org/presentationml/2006/main">
+  <p:cSld>
+    <p:spTree>
+      <p:nvGrpSpPr>
+        <p:cNvPr id="1" name=""/>
+        <p:cNvGrpSpPr/>
+        <p:nvPr/>
+      </p:nvGrpSpPr>
+      <p:grpSpPr>
+        <a:xfrm>
+          <a:off x="0" y="0"/>
+          <a:ext cx="0" cy="0"/>
+          <a:chOff x="0" y="0"/>
+          <a:chExt cx="0" cy="0"/>
+        </a:xfrm>
+      </p:grpSpPr>
+      <p:sp>
+        <p:nvSpPr>
+          <p:cNvPr id="2" name="제목 1">
+            <a:extLst>
+              <a:ext uri="{FF2B5EF4-FFF2-40B4-BE49-F238E27FC236}">
+                <a16:creationId xmlns:a16="http://schemas.microsoft.com/office/drawing/2014/main" id="{89B687D0-EFF0-44E2-94B1-89E2D1470840}"/>
+              </a:ext>
+            </a:extLst>
+          </p:cNvPr>
+          <p:cNvSpPr>
+            <a:spLocks noGrp="1"/>
+          </p:cNvSpPr>
+          <p:nvPr>
+            <p:ph type="title"/>
+          </p:nvPr>
+        </p:nvSpPr>
+        <p:spPr/>
+        <p:txBody>
+          <a:bodyPr/>
+          <a:lstStyle/>
+          <a:p>
+            <a:r>
+              <a:rPr lang="en-US" altLang="ko-KR" dirty="0"/>
+              <a:t>Optimizer – Gradient Descent</a:t>
+            </a:r>
+            <a:endParaRPr lang="ko-KR" altLang="en-US" dirty="0"/>
+          </a:p>
+        </p:txBody>
+      </p:sp>
+      <mc:AlternateContent xmlns:mc="http://schemas.openxmlformats.org/markup-compatibility/2006">
+        <mc:Choice xmlns:a14="http://schemas.microsoft.com/office/drawing/2010/main" Requires="a14">
+          <p:sp>
+            <p:nvSpPr>
+              <p:cNvPr id="4" name="내용 개체 틀 2">
+                <a:extLst>
+                  <a:ext uri="{FF2B5EF4-FFF2-40B4-BE49-F238E27FC236}">
+                    <a16:creationId xmlns:a16="http://schemas.microsoft.com/office/drawing/2014/main" id="{4CC1C456-A97C-4C38-A030-883F3D3F3321}"/>
+                  </a:ext>
+                </a:extLst>
+              </p:cNvPr>
+              <p:cNvSpPr>
+                <a:spLocks noGrp="1"/>
+              </p:cNvSpPr>
+              <p:nvPr>
+                <p:ph idx="1"/>
+              </p:nvPr>
+            </p:nvSpPr>
+            <p:spPr>
+              <a:xfrm>
+                <a:off x="1097280" y="1845734"/>
+                <a:ext cx="4602635" cy="4023360"/>
+              </a:xfrm>
+            </p:spPr>
+            <p:txBody>
+              <a:bodyPr>
+                <a:normAutofit/>
+              </a:bodyPr>
+              <a:lstStyle/>
+              <a:p>
+                <a14:m>
+                  <m:oMath xmlns:m="http://schemas.openxmlformats.org/officeDocument/2006/math">
+                    <m:r>
+                      <a:rPr lang="el-GR" altLang="ko-KR" i="1">
+                        <a:latin typeface="Cambria Math" panose="02040503050406030204" pitchFamily="18" charset="0"/>
+                      </a:rPr>
+                      <m:t>𝜃</m:t>
+                    </m:r>
+                    <m:r>
+                      <a:rPr lang="en-US" altLang="ko-KR" i="1">
+                        <a:latin typeface="Cambria Math" panose="02040503050406030204" pitchFamily="18" charset="0"/>
+                        <a:ea typeface="Cambria Math" panose="02040503050406030204" pitchFamily="18" charset="0"/>
+                      </a:rPr>
+                      <m:t>←</m:t>
+                    </m:r>
+                    <m:r>
+                      <a:rPr lang="el-GR" altLang="ko-KR" i="1">
+                        <a:latin typeface="Cambria Math" panose="02040503050406030204" pitchFamily="18" charset="0"/>
+                      </a:rPr>
+                      <m:t>𝜃</m:t>
+                    </m:r>
+                    <m:r>
+                      <a:rPr lang="en-US" altLang="ko-KR" b="0" i="1" smtClean="0">
+                        <a:latin typeface="Cambria Math" panose="02040503050406030204" pitchFamily="18" charset="0"/>
+                      </a:rPr>
+                      <m:t> − </m:t>
+                    </m:r>
+                    <m:r>
+                      <a:rPr lang="ko-KR" altLang="en-US" b="0" i="1" smtClean="0">
+                        <a:latin typeface="Cambria Math" panose="02040503050406030204" pitchFamily="18" charset="0"/>
+                      </a:rPr>
+                      <m:t>𝜇</m:t>
+                    </m:r>
+                    <m:f>
+                      <m:fPr>
+                        <m:ctrlPr>
+                          <a:rPr lang="en-US" altLang="ko-KR" i="1" smtClean="0">
+                            <a:latin typeface="Cambria Math" panose="02040503050406030204" pitchFamily="18" charset="0"/>
+                          </a:rPr>
+                        </m:ctrlPr>
+                      </m:fPr>
+                      <m:num>
+                        <m:r>
+                          <a:rPr lang="en-US" altLang="ko-KR" i="1" smtClean="0">
+                            <a:latin typeface="Cambria Math" panose="02040503050406030204" pitchFamily="18" charset="0"/>
+                          </a:rPr>
+                          <m:t>𝜕</m:t>
+                        </m:r>
+                        <m:r>
+                          <a:rPr lang="en-US" altLang="ko-KR" b="0" i="1" smtClean="0">
+                            <a:latin typeface="Cambria Math" panose="02040503050406030204" pitchFamily="18" charset="0"/>
+                          </a:rPr>
+                          <m:t>𝐿</m:t>
+                        </m:r>
+                      </m:num>
+                      <m:den>
+                        <m:r>
+                          <a:rPr lang="en-US" altLang="ko-KR" i="1" smtClean="0">
+                            <a:latin typeface="Cambria Math" panose="02040503050406030204" pitchFamily="18" charset="0"/>
+                          </a:rPr>
+                          <m:t>𝜕</m:t>
+                        </m:r>
+                        <m:r>
+                          <a:rPr lang="el-GR" altLang="ko-KR" i="1">
+                            <a:latin typeface="Cambria Math" panose="02040503050406030204" pitchFamily="18" charset="0"/>
+                          </a:rPr>
+                          <m:t>𝜃</m:t>
+                        </m:r>
+                      </m:den>
+                    </m:f>
+                  </m:oMath>
+                </a14:m>
+                <a:endParaRPr lang="en-US" altLang="ko-KR" dirty="0"/>
+              </a:p>
+              <a:p>
+                <a14:m>
+                  <m:oMath xmlns:m="http://schemas.openxmlformats.org/officeDocument/2006/math">
+                    <m:r>
+                      <a:rPr lang="el-GR" altLang="ko-KR" sz="1600" i="1">
+                        <a:latin typeface="Cambria Math" panose="02040503050406030204" pitchFamily="18" charset="0"/>
+                      </a:rPr>
+                      <m:t>𝜃</m:t>
+                    </m:r>
+                  </m:oMath>
+                </a14:m>
+                <a:r>
+                  <a:rPr lang="en-US" altLang="ko-KR" sz="1600" dirty="0"/>
+                  <a:t> : </a:t>
+                </a:r>
+                <a:r>
+                  <a:rPr lang="ko-KR" altLang="en-US" sz="1600" dirty="0"/>
+                  <a:t>갱신 대상 학습 파라미터</a:t>
+                </a:r>
+                <a:endParaRPr lang="en-US" altLang="ko-KR" sz="1600" i="1" dirty="0">
+                  <a:latin typeface="Cambria Math" panose="02040503050406030204" pitchFamily="18" charset="0"/>
+                </a:endParaRPr>
+              </a:p>
+              <a:p>
+                <a14:m>
+                  <m:oMath xmlns:m="http://schemas.openxmlformats.org/officeDocument/2006/math">
+                    <m:f>
+                      <m:fPr>
+                        <m:ctrlPr>
+                          <a:rPr lang="en-US" altLang="ko-KR" sz="1600" i="1">
+                            <a:latin typeface="Cambria Math" panose="02040503050406030204" pitchFamily="18" charset="0"/>
+                          </a:rPr>
+                        </m:ctrlPr>
+                      </m:fPr>
+                      <m:num>
+                        <m:r>
+                          <a:rPr lang="en-US" altLang="ko-KR" sz="1600" i="1">
+                            <a:latin typeface="Cambria Math" panose="02040503050406030204" pitchFamily="18" charset="0"/>
+                          </a:rPr>
+                          <m:t>𝜕</m:t>
+                        </m:r>
+                        <m:r>
+                          <a:rPr lang="en-US" altLang="ko-KR" sz="1600" i="1">
+                            <a:latin typeface="Cambria Math" panose="02040503050406030204" pitchFamily="18" charset="0"/>
+                          </a:rPr>
+                          <m:t>𝐿</m:t>
+                        </m:r>
+                      </m:num>
+                      <m:den>
+                        <m:r>
+                          <a:rPr lang="en-US" altLang="ko-KR" sz="1600" i="1">
+                            <a:latin typeface="Cambria Math" panose="02040503050406030204" pitchFamily="18" charset="0"/>
+                          </a:rPr>
+                          <m:t>𝜕</m:t>
+                        </m:r>
+                        <m:r>
+                          <a:rPr lang="el-GR" altLang="ko-KR" sz="1600" i="1">
+                            <a:latin typeface="Cambria Math" panose="02040503050406030204" pitchFamily="18" charset="0"/>
+                          </a:rPr>
+                          <m:t>𝜃</m:t>
+                        </m:r>
+                      </m:den>
+                    </m:f>
+                  </m:oMath>
+                </a14:m>
+                <a:r>
+                  <a:rPr lang="en-US" altLang="ko-KR" sz="1600" dirty="0"/>
+                  <a:t> : loss </a:t>
+                </a:r>
+                <a:r>
+                  <a:rPr lang="ko-KR" altLang="en-US" sz="1600" dirty="0"/>
+                  <a:t>에 대한</a:t>
+                </a:r>
+                <a:r>
+                  <a:rPr lang="el-GR" altLang="ko-KR" sz="1600" dirty="0"/>
+                  <a:t> </a:t>
+                </a:r>
+                <a14:m>
+                  <m:oMath xmlns:m="http://schemas.openxmlformats.org/officeDocument/2006/math">
+                    <m:r>
+                      <a:rPr lang="el-GR" altLang="ko-KR" sz="1600" i="1">
+                        <a:latin typeface="Cambria Math" panose="02040503050406030204" pitchFamily="18" charset="0"/>
+                      </a:rPr>
+                      <m:t>𝜃</m:t>
+                    </m:r>
+                  </m:oMath>
+                </a14:m>
+                <a:r>
+                  <a:rPr lang="ko-KR" altLang="en-US" sz="1600" dirty="0"/>
+                  <a:t>의 </a:t>
+                </a:r>
+                <a:r>
+                  <a:rPr lang="en-US" altLang="ko-KR" sz="1600" dirty="0"/>
+                  <a:t>gradient</a:t>
+                </a:r>
+              </a:p>
+              <a:p>
+                <a14:m>
+                  <m:oMath xmlns:m="http://schemas.openxmlformats.org/officeDocument/2006/math">
+                    <m:r>
+                      <a:rPr lang="ko-KR" altLang="en-US" sz="1600" i="1">
+                        <a:latin typeface="Cambria Math" panose="02040503050406030204" pitchFamily="18" charset="0"/>
+                      </a:rPr>
+                      <m:t>𝜇</m:t>
+                    </m:r>
+                  </m:oMath>
+                </a14:m>
+                <a:r>
+                  <a:rPr lang="en-US" altLang="ko-KR" sz="1600" dirty="0"/>
+                  <a:t> : learning rate</a:t>
+                </a:r>
+              </a:p>
+              <a:p>
+                <a:r>
+                  <a:rPr lang="en-US" altLang="ko-KR" dirty="0"/>
+                  <a:t>Loss </a:t>
+                </a:r>
+                <a:r>
+                  <a:rPr lang="ko-KR" altLang="en-US" dirty="0"/>
+                  <a:t>에 대한 </a:t>
+                </a:r>
+                <a14:m>
+                  <m:oMath xmlns:m="http://schemas.openxmlformats.org/officeDocument/2006/math">
+                    <m:r>
+                      <a:rPr lang="el-GR" altLang="ko-KR" i="1">
+                        <a:latin typeface="Cambria Math" panose="02040503050406030204" pitchFamily="18" charset="0"/>
+                      </a:rPr>
+                      <m:t>𝜃</m:t>
+                    </m:r>
+                    <m:r>
+                      <a:rPr lang="ko-KR" altLang="en-US" i="1">
+                        <a:latin typeface="Cambria Math" panose="02040503050406030204" pitchFamily="18" charset="0"/>
+                      </a:rPr>
+                      <m:t>의</m:t>
+                    </m:r>
+                  </m:oMath>
+                </a14:m>
+                <a:r>
+                  <a:rPr lang="en-US" altLang="ko-KR" dirty="0"/>
+                  <a:t> gradient </a:t>
+                </a:r>
+                <a:r>
+                  <a:rPr lang="ko-KR" altLang="en-US" dirty="0"/>
+                  <a:t>반대 방향으로 </a:t>
+                </a:r>
+                <a14:m>
+                  <m:oMath xmlns:m="http://schemas.openxmlformats.org/officeDocument/2006/math">
+                    <m:r>
+                      <a:rPr lang="ko-KR" altLang="en-US" i="1">
+                        <a:latin typeface="Cambria Math" panose="02040503050406030204" pitchFamily="18" charset="0"/>
+                      </a:rPr>
+                      <m:t>𝜇</m:t>
+                    </m:r>
+                  </m:oMath>
+                </a14:m>
+                <a:r>
+                  <a:rPr lang="ko-KR" altLang="en-US" dirty="0"/>
+                  <a:t>만큼 조금씩 </a:t>
+                </a:r>
+                <a14:m>
+                  <m:oMath xmlns:m="http://schemas.openxmlformats.org/officeDocument/2006/math">
+                    <m:r>
+                      <a:rPr lang="el-GR" altLang="ko-KR" i="1">
+                        <a:latin typeface="Cambria Math" panose="02040503050406030204" pitchFamily="18" charset="0"/>
+                      </a:rPr>
+                      <m:t>𝜃</m:t>
+                    </m:r>
+                  </m:oMath>
+                </a14:m>
+                <a:r>
+                  <a:rPr lang="ko-KR" altLang="en-US" dirty="0"/>
+                  <a:t>를 업데이트 시켜 </a:t>
+                </a:r>
+                <a:r>
+                  <a:rPr lang="en-US" altLang="ko-KR" dirty="0"/>
+                  <a:t>Loss</a:t>
+                </a:r>
+                <a:r>
+                  <a:rPr lang="ko-KR" altLang="en-US" dirty="0"/>
+                  <a:t>를 최소화 하는 </a:t>
+                </a:r>
+                <a14:m>
+                  <m:oMath xmlns:m="http://schemas.openxmlformats.org/officeDocument/2006/math">
+                    <m:r>
+                      <a:rPr lang="el-GR" altLang="ko-KR" i="1">
+                        <a:latin typeface="Cambria Math" panose="02040503050406030204" pitchFamily="18" charset="0"/>
+                      </a:rPr>
+                      <m:t>𝜃</m:t>
+                    </m:r>
+                  </m:oMath>
+                </a14:m>
+                <a:r>
+                  <a:rPr lang="ko-KR" altLang="en-US" dirty="0"/>
+                  <a:t>를 찾는다</a:t>
+                </a:r>
+                <a:r>
+                  <a:rPr lang="en-US" altLang="ko-KR" dirty="0"/>
+                  <a:t>.</a:t>
+                </a:r>
+                <a:endParaRPr lang="ko-KR" altLang="en-US" dirty="0"/>
+              </a:p>
+              <a:p>
+                <a:endParaRPr lang="ko-KR" altLang="en-US" dirty="0"/>
+              </a:p>
+            </p:txBody>
+          </p:sp>
+        </mc:Choice>
+        <mc:Fallback>
+          <p:sp>
+            <p:nvSpPr>
+              <p:cNvPr id="4" name="내용 개체 틀 2">
+                <a:extLst>
+                  <a:ext uri="{FF2B5EF4-FFF2-40B4-BE49-F238E27FC236}">
+                    <a16:creationId xmlns:a16="http://schemas.microsoft.com/office/drawing/2014/main" id="{4CC1C456-A97C-4C38-A030-883F3D3F3321}"/>
+                  </a:ext>
+                </a:extLst>
+              </p:cNvPr>
+              <p:cNvSpPr>
+                <a:spLocks noGrp="1" noRot="1" noChangeAspect="1" noMove="1" noResize="1" noEditPoints="1" noAdjustHandles="1" noChangeArrowheads="1" noChangeShapeType="1" noTextEdit="1"/>
+              </p:cNvSpPr>
+              <p:nvPr>
+                <p:ph idx="1"/>
+              </p:nvPr>
+            </p:nvSpPr>
+            <p:spPr>
+              <a:xfrm>
+                <a:off x="1097280" y="1845734"/>
+                <a:ext cx="4602635" cy="4023360"/>
+              </a:xfrm>
+              <a:blipFill>
+                <a:blip r:embed="rId2"/>
+                <a:stretch>
+                  <a:fillRect l="-2649"/>
+                </a:stretch>
+              </a:blipFill>
+            </p:spPr>
+            <p:txBody>
+              <a:bodyPr/>
+              <a:lstStyle/>
+              <a:p>
+                <a:r>
+                  <a:rPr lang="ko-KR" altLang="en-US">
+                    <a:noFill/>
+                  </a:rPr>
+                  <a:t> </a:t>
+                </a:r>
+              </a:p>
+            </p:txBody>
+          </p:sp>
+        </mc:Fallback>
+      </mc:AlternateContent>
+      <p:pic>
+        <p:nvPicPr>
+          <p:cNvPr id="1026" name="Picture 2" descr="gradient descent 알고리즘에 대한 이미지 검색결과">
+            <a:extLst>
+              <a:ext uri="{FF2B5EF4-FFF2-40B4-BE49-F238E27FC236}">
+                <a16:creationId xmlns:a16="http://schemas.microsoft.com/office/drawing/2014/main" id="{856281DA-1784-4F99-9A3D-A0B6418B4555}"/>
+              </a:ext>
+            </a:extLst>
+          </p:cNvPr>
+          <p:cNvPicPr>
+            <a:picLocks noChangeAspect="1" noChangeArrowheads="1"/>
+          </p:cNvPicPr>
+          <p:nvPr/>
+        </p:nvPicPr>
+        <p:blipFill>
+          <a:blip r:embed="rId3">
+            <a:extLst>
+              <a:ext uri="{28A0092B-C50C-407E-A947-70E740481C1C}">
+                <a14:useLocalDpi xmlns:a14="http://schemas.microsoft.com/office/drawing/2010/main" val="0"/>
+              </a:ext>
+            </a:extLst>
+          </a:blip>
+          <a:srcRect/>
+          <a:stretch>
+            <a:fillRect/>
+          </a:stretch>
+        </p:blipFill>
+        <p:spPr bwMode="auto">
+          <a:xfrm>
+            <a:off x="5809496" y="2583885"/>
+            <a:ext cx="5448300" cy="2952750"/>
+          </a:xfrm>
+          <a:prstGeom prst="rect">
+            <a:avLst/>
+          </a:prstGeom>
+          <a:noFill/>
+          <a:extLst>
+            <a:ext uri="{909E8E84-426E-40DD-AFC4-6F175D3DCCD1}">
+              <a14:hiddenFill xmlns:a14="http://schemas.microsoft.com/office/drawing/2010/main">
+                <a:solidFill>
+                  <a:srgbClr val="FFFFFF"/>
+                </a:solidFill>
+              </a14:hiddenFill>
+            </a:ext>
+          </a:extLst>
+        </p:spPr>
+      </p:pic>
+    </p:spTree>
+    <p:extLst>
+      <p:ext uri="{BB962C8B-B14F-4D97-AF65-F5344CB8AC3E}">
+        <p14:creationId xmlns:p14="http://schemas.microsoft.com/office/powerpoint/2010/main" val="3177899926"/>
+      </p:ext>
+    </p:extLst>
+  </p:cSld>
+  <p:clrMapOvr>
+    <a:masterClrMapping/>
+  </p:clrMapOvr>
+</p:sld>
+</file>
+
+<file path=ppt/slides/slide31.xml><?xml version="1.0" encoding="utf-8"?>
+<p:sld xmlns:a="http://schemas.openxmlformats.org/drawingml/2006/main" xmlns:r="http://schemas.openxmlformats.org/officeDocument/2006/relationships" xmlns:p="http://schemas.openxmlformats.org/presentationml/2006/main">
+  <p:cSld>
+    <p:spTree>
+      <p:nvGrpSpPr>
+        <p:cNvPr id="1" name=""/>
+        <p:cNvGrpSpPr/>
+        <p:nvPr/>
+      </p:nvGrpSpPr>
+      <p:grpSpPr>
+        <a:xfrm>
+          <a:off x="0" y="0"/>
+          <a:ext cx="0" cy="0"/>
+          <a:chOff x="0" y="0"/>
+          <a:chExt cx="0" cy="0"/>
+        </a:xfrm>
+      </p:grpSpPr>
+      <p:sp>
+        <p:nvSpPr>
+          <p:cNvPr id="2" name="제목 1">
+            <a:extLst>
+              <a:ext uri="{FF2B5EF4-FFF2-40B4-BE49-F238E27FC236}">
+                <a16:creationId xmlns:a16="http://schemas.microsoft.com/office/drawing/2014/main" id="{89B687D0-EFF0-44E2-94B1-89E2D1470840}"/>
+              </a:ext>
+            </a:extLst>
+          </p:cNvPr>
+          <p:cNvSpPr>
+            <a:spLocks noGrp="1"/>
+          </p:cNvSpPr>
+          <p:nvPr>
+            <p:ph type="title"/>
+          </p:nvPr>
+        </p:nvSpPr>
+        <p:spPr/>
+        <p:txBody>
+          <a:bodyPr>
+            <a:normAutofit/>
+          </a:bodyPr>
+          <a:lstStyle/>
+          <a:p>
+            <a:r>
+              <a:rPr lang="en-US" altLang="ko-KR" dirty="0"/>
+              <a:t>Optimizer – Stochastic Gradient Descent</a:t>
+            </a:r>
+            <a:endParaRPr lang="ko-KR" altLang="en-US" dirty="0"/>
+          </a:p>
+        </p:txBody>
+      </p:sp>
+      <p:sp>
+        <p:nvSpPr>
+          <p:cNvPr id="4" name="내용 개체 틀 2">
+            <a:extLst>
+              <a:ext uri="{FF2B5EF4-FFF2-40B4-BE49-F238E27FC236}">
+                <a16:creationId xmlns:a16="http://schemas.microsoft.com/office/drawing/2014/main" id="{4CC1C456-A97C-4C38-A030-883F3D3F3321}"/>
+              </a:ext>
+            </a:extLst>
+          </p:cNvPr>
+          <p:cNvSpPr>
+            <a:spLocks noGrp="1"/>
+          </p:cNvSpPr>
+          <p:nvPr>
+            <p:ph idx="1"/>
+          </p:nvPr>
+        </p:nvSpPr>
+        <p:spPr>
+          <a:xfrm>
+            <a:off x="1097280" y="1845734"/>
+            <a:ext cx="10058400" cy="4023360"/>
+          </a:xfrm>
+        </p:spPr>
+        <p:txBody>
+          <a:bodyPr>
+            <a:normAutofit/>
+          </a:bodyPr>
+          <a:lstStyle/>
+          <a:p>
+            <a:r>
+              <a:rPr lang="en-US" altLang="ko-KR" sz="1600" dirty="0"/>
+              <a:t>Batch Gradient Descent : Loss</a:t>
+            </a:r>
+            <a:r>
+              <a:rPr lang="ko-KR" altLang="en-US" sz="1600" dirty="0"/>
+              <a:t> </a:t>
+            </a:r>
+            <a:r>
+              <a:rPr lang="en-US" altLang="ko-KR" sz="1600" dirty="0"/>
+              <a:t>Function</a:t>
+            </a:r>
+            <a:r>
+              <a:rPr lang="ko-KR" altLang="en-US" sz="1600" dirty="0"/>
+              <a:t>을 계산할 때 전체 </a:t>
+            </a:r>
+            <a:r>
+              <a:rPr lang="en-US" altLang="ko-KR" sz="1600" dirty="0"/>
+              <a:t>train set</a:t>
+            </a:r>
+            <a:r>
+              <a:rPr lang="ko-KR" altLang="en-US" sz="1600" dirty="0"/>
+              <a:t>을 사용하는 것</a:t>
+            </a:r>
+            <a:r>
+              <a:rPr lang="en-US" altLang="ko-KR" sz="1600" dirty="0"/>
+              <a:t>.</a:t>
+            </a:r>
+          </a:p>
+          <a:p>
+            <a:pPr lvl="1"/>
+            <a:r>
+              <a:rPr lang="en-US" altLang="ko-KR" sz="1400" dirty="0"/>
+              <a:t>Input</a:t>
+            </a:r>
+            <a:r>
+              <a:rPr lang="ko-KR" altLang="en-US" sz="1400" dirty="0"/>
+              <a:t> </a:t>
+            </a:r>
+            <a:r>
+              <a:rPr lang="en-US" altLang="ko-KR" sz="1400" dirty="0"/>
+              <a:t>data</a:t>
+            </a:r>
+            <a:r>
+              <a:rPr lang="ko-KR" altLang="en-US" sz="1400" dirty="0"/>
+              <a:t>가 너무 많아서 모든 </a:t>
+            </a:r>
+            <a:r>
+              <a:rPr lang="en-US" altLang="ko-KR" sz="1400" dirty="0"/>
+              <a:t>training data</a:t>
+            </a:r>
+            <a:r>
+              <a:rPr lang="ko-KR" altLang="en-US" sz="1400" dirty="0"/>
+              <a:t>에 대해 </a:t>
+            </a:r>
+            <a:r>
+              <a:rPr lang="en-US" altLang="ko-KR" sz="1400" dirty="0"/>
+              <a:t>gradient </a:t>
+            </a:r>
+            <a:r>
+              <a:rPr lang="ko-KR" altLang="en-US" sz="1400" dirty="0"/>
+              <a:t>를 계산 하고 평균을 낸 후 </a:t>
+            </a:r>
+            <a:r>
+              <a:rPr lang="en-US" altLang="ko-KR" sz="1400" dirty="0"/>
+              <a:t>update</a:t>
+            </a:r>
+          </a:p>
+          <a:p>
+            <a:pPr lvl="1"/>
+            <a:r>
+              <a:rPr lang="ko-KR" altLang="en-US" sz="1400" dirty="0"/>
+              <a:t>너무 많은 계산 량이 필요 하다</a:t>
+            </a:r>
+            <a:r>
+              <a:rPr lang="en-US" altLang="ko-KR" sz="1400" dirty="0"/>
+              <a:t> -&gt; SGD </a:t>
+            </a:r>
+            <a:r>
+              <a:rPr lang="ko-KR" altLang="en-US" sz="1400" dirty="0"/>
+              <a:t>사용</a:t>
+            </a:r>
+            <a:endParaRPr lang="en-US" altLang="ko-KR" sz="1400" dirty="0"/>
+          </a:p>
+          <a:p>
+            <a:r>
+              <a:rPr lang="en-US" altLang="ko-KR" sz="1600" dirty="0"/>
+              <a:t>Loss Function</a:t>
+            </a:r>
+            <a:r>
+              <a:rPr lang="ko-KR" altLang="en-US" sz="1600" dirty="0"/>
+              <a:t>을 계산 할 때 일부 조그마한 데이터의 모음에 대해서만 계산</a:t>
+            </a:r>
+            <a:endParaRPr lang="en-US" altLang="ko-KR" sz="1600" dirty="0"/>
+          </a:p>
+          <a:p>
+            <a:pPr lvl="1"/>
+            <a:r>
+              <a:rPr lang="en-US" altLang="ko-KR" sz="1400" dirty="0"/>
+              <a:t>Batch Gradient Descent </a:t>
+            </a:r>
+            <a:r>
+              <a:rPr lang="ko-KR" altLang="en-US" sz="1400" dirty="0"/>
+              <a:t>보다는 부정확 하지만 빠르다</a:t>
+            </a:r>
+            <a:r>
+              <a:rPr lang="en-US" altLang="ko-KR" sz="1400" dirty="0"/>
+              <a:t>.</a:t>
+            </a:r>
+          </a:p>
+          <a:p>
+            <a:pPr lvl="1"/>
+            <a:r>
+              <a:rPr lang="ko-KR" altLang="en-US" sz="1400" dirty="0"/>
+              <a:t>여러 번 반복 할 경우 </a:t>
+            </a:r>
+            <a:r>
+              <a:rPr lang="en-US" altLang="ko-KR" sz="1400" dirty="0"/>
+              <a:t>BGD</a:t>
+            </a:r>
+            <a:r>
+              <a:rPr lang="ko-KR" altLang="en-US" sz="1400" dirty="0"/>
+              <a:t>의 결과와 유사한 결과로 수렴한다</a:t>
+            </a:r>
+            <a:r>
+              <a:rPr lang="en-US" altLang="ko-KR" sz="1400" dirty="0"/>
+              <a:t>.</a:t>
+            </a:r>
+          </a:p>
+          <a:p>
+            <a:pPr lvl="1"/>
+            <a:r>
+              <a:rPr lang="en-US" altLang="ko-KR" sz="1400" dirty="0"/>
+              <a:t>Local minima</a:t>
+            </a:r>
+            <a:r>
+              <a:rPr lang="ko-KR" altLang="en-US" sz="1400" dirty="0"/>
+              <a:t>에 빠지지 않고 더 좋은 결과 낼 수 있다</a:t>
+            </a:r>
+            <a:r>
+              <a:rPr lang="en-US" altLang="ko-KR" sz="1400" dirty="0"/>
+              <a:t>.</a:t>
+            </a:r>
+          </a:p>
+          <a:p>
+            <a:pPr lvl="1"/>
+            <a:r>
+              <a:rPr lang="ko-KR" altLang="en-US" sz="1400" dirty="0"/>
+              <a:t>하지만 이것 도한 다른 알고리즘에 비해 성능이 낮다</a:t>
+            </a:r>
+            <a:r>
+              <a:rPr lang="en-US" altLang="ko-KR" sz="1400" dirty="0"/>
+              <a:t>.</a:t>
+            </a:r>
+          </a:p>
+        </p:txBody>
+      </p:sp>
+      <p:pic>
+        <p:nvPicPr>
+          <p:cNvPr id="6" name="Picture 4" descr="http://aikorea.org/cs231n/assets/nn3/opt2.gif">
+            <a:extLst>
+              <a:ext uri="{FF2B5EF4-FFF2-40B4-BE49-F238E27FC236}">
+                <a16:creationId xmlns:a16="http://schemas.microsoft.com/office/drawing/2014/main" id="{282A0447-ADE0-4EB9-82C9-1FA8234EA7C2}"/>
+              </a:ext>
+            </a:extLst>
+          </p:cNvPr>
+          <p:cNvPicPr>
+            <a:picLocks noChangeAspect="1" noChangeArrowheads="1" noCrop="1"/>
+          </p:cNvPicPr>
+          <p:nvPr/>
+        </p:nvPicPr>
+        <p:blipFill>
+          <a:blip r:embed="rId2">
+            <a:extLst>
+              <a:ext uri="{28A0092B-C50C-407E-A947-70E740481C1C}">
+                <a14:useLocalDpi xmlns:a14="http://schemas.microsoft.com/office/drawing/2010/main" val="0"/>
+              </a:ext>
+            </a:extLst>
+          </a:blip>
+          <a:srcRect/>
+          <a:stretch>
+            <a:fillRect/>
+          </a:stretch>
+        </p:blipFill>
+        <p:spPr bwMode="auto">
+          <a:xfrm>
+            <a:off x="7742228" y="3081121"/>
+            <a:ext cx="3413451" cy="2642671"/>
+          </a:xfrm>
+          <a:prstGeom prst="rect">
+            <a:avLst/>
+          </a:prstGeom>
+          <a:noFill/>
+          <a:ln>
+            <a:solidFill>
+              <a:schemeClr val="tx1"/>
+            </a:solidFill>
+          </a:ln>
+          <a:extLst>
+            <a:ext uri="{909E8E84-426E-40DD-AFC4-6F175D3DCCD1}">
+              <a14:hiddenFill xmlns:a14="http://schemas.microsoft.com/office/drawing/2010/main">
+                <a:solidFill>
+                  <a:srgbClr val="FFFFFF"/>
+                </a:solidFill>
+              </a14:hiddenFill>
+            </a:ext>
+          </a:extLst>
+        </p:spPr>
+      </p:pic>
+    </p:spTree>
+    <p:extLst>
+      <p:ext uri="{BB962C8B-B14F-4D97-AF65-F5344CB8AC3E}">
+        <p14:creationId xmlns:p14="http://schemas.microsoft.com/office/powerpoint/2010/main" val="1754134360"/>
+      </p:ext>
+    </p:extLst>
+  </p:cSld>
+  <p:clrMapOvr>
+    <a:masterClrMapping/>
+  </p:clrMapOvr>
+  <p:timing>
+    <p:tnLst>
+      <p:par>
+        <p:cTn id="1" dur="indefinite" restart="never" nodeType="tmRoot">
+          <p:childTnLst>
+            <p:seq concurrent="1" nextAc="seek">
+              <p:cTn id="2" dur="indefinite" nodeType="mainSeq">
+                <p:childTnLst>
+                  <p:par>
+                    <p:cTn id="3" fill="hold">
+                      <p:stCondLst>
+                        <p:cond delay="indefinite"/>
+                      </p:stCondLst>
+                      <p:childTnLst>
+                        <p:par>
+                          <p:cTn id="4" fill="hold">
+                            <p:stCondLst>
+                              <p:cond delay="0"/>
+                            </p:stCondLst>
+                            <p:childTnLst>
+                              <p:par>
+                                <p:cTn id="5" presetID="1" presetClass="entr" presetSubtype="0" fill="hold" nodeType="clickEffect">
+                                  <p:stCondLst>
+                                    <p:cond delay="0"/>
+                                  </p:stCondLst>
+                                  <p:childTnLst>
+                                    <p:set>
+                                      <p:cBhvr>
+                                        <p:cTn id="6" dur="1" fill="hold">
+                                          <p:stCondLst>
+                                            <p:cond delay="0"/>
+                                          </p:stCondLst>
+                                        </p:cTn>
+                                        <p:tgtEl>
+                                          <p:spTgt spid="6"/>
+                                        </p:tgtEl>
+                                        <p:attrNameLst>
+                                          <p:attrName>style.visibility</p:attrName>
+                                        </p:attrNameLst>
+                                      </p:cBhvr>
+                                      <p:to>
+                                        <p:strVal val="visible"/>
+                                      </p:to>
+                                    </p:set>
+                                  </p:childTnLst>
+                                </p:cTn>
+                              </p:par>
+                            </p:childTnLst>
+                          </p:cTn>
+                        </p:par>
+                      </p:childTnLst>
+                    </p:cTn>
+                  </p:par>
+                </p:childTnLst>
+              </p:cTn>
+              <p:prevCondLst>
+                <p:cond evt="onPrev" delay="0">
+                  <p:tgtEl>
+                    <p:sldTgt/>
+                  </p:tgtEl>
+                </p:cond>
+              </p:prevCondLst>
+              <p:nextCondLst>
+                <p:cond evt="onNext" delay="0">
+                  <p:tgtEl>
+                    <p:sldTgt/>
+                  </p:tgtEl>
+                </p:cond>
+              </p:nextCondLst>
+            </p:seq>
+          </p:childTnLst>
+        </p:cTn>
+      </p:par>
+    </p:tnLst>
+  </p:timing>
+</p:sld>
+</file>
+
+<file path=ppt/slides/slide32.xml><?xml version="1.0" encoding="utf-8"?>
+<p:sld xmlns:a="http://schemas.openxmlformats.org/drawingml/2006/main" xmlns:r="http://schemas.openxmlformats.org/officeDocument/2006/relationships" xmlns:p="http://schemas.openxmlformats.org/presentationml/2006/main">
+  <p:cSld>
+    <p:spTree>
+      <p:nvGrpSpPr>
+        <p:cNvPr id="1" name=""/>
+        <p:cNvGrpSpPr/>
+        <p:nvPr/>
+      </p:nvGrpSpPr>
+      <p:grpSpPr>
+        <a:xfrm>
+          <a:off x="0" y="0"/>
+          <a:ext cx="0" cy="0"/>
+          <a:chOff x="0" y="0"/>
+          <a:chExt cx="0" cy="0"/>
+        </a:xfrm>
+      </p:grpSpPr>
+      <p:sp>
+        <p:nvSpPr>
+          <p:cNvPr id="2" name="제목 1">
+            <a:extLst>
+              <a:ext uri="{FF2B5EF4-FFF2-40B4-BE49-F238E27FC236}">
+                <a16:creationId xmlns:a16="http://schemas.microsoft.com/office/drawing/2014/main" id="{89B687D0-EFF0-44E2-94B1-89E2D1470840}"/>
+              </a:ext>
+            </a:extLst>
+          </p:cNvPr>
+          <p:cNvSpPr>
+            <a:spLocks noGrp="1"/>
+          </p:cNvSpPr>
+          <p:nvPr>
+            <p:ph type="title"/>
+          </p:nvPr>
+        </p:nvSpPr>
+        <p:spPr/>
+        <p:txBody>
+          <a:bodyPr>
+            <a:normAutofit/>
+          </a:bodyPr>
+          <a:lstStyle/>
+          <a:p>
+            <a:r>
+              <a:rPr lang="en-US" altLang="ko-KR" dirty="0"/>
+              <a:t>Optimizer – Momentum</a:t>
+            </a:r>
+            <a:endParaRPr lang="ko-KR" altLang="en-US" dirty="0"/>
+          </a:p>
+        </p:txBody>
+      </p:sp>
+      <p:sp>
+        <p:nvSpPr>
+          <p:cNvPr id="5" name="내용 개체 틀 2">
+            <a:extLst>
+              <a:ext uri="{FF2B5EF4-FFF2-40B4-BE49-F238E27FC236}">
+                <a16:creationId xmlns:a16="http://schemas.microsoft.com/office/drawing/2014/main" id="{FA561796-6022-4021-99D6-3E956E07D4F6}"/>
+              </a:ext>
+            </a:extLst>
+          </p:cNvPr>
+          <p:cNvSpPr>
+            <a:spLocks noGrp="1"/>
+          </p:cNvSpPr>
+          <p:nvPr>
+            <p:ph idx="1"/>
+          </p:nvPr>
+        </p:nvSpPr>
+        <p:spPr>
+          <a:xfrm>
+            <a:off x="1097280" y="1845734"/>
+            <a:ext cx="10058400" cy="4023360"/>
+          </a:xfrm>
+        </p:spPr>
+        <p:txBody>
+          <a:bodyPr>
+            <a:normAutofit/>
+          </a:bodyPr>
+          <a:lstStyle/>
+          <a:p>
+            <a:endParaRPr lang="en-US" altLang="ko-KR" dirty="0"/>
+          </a:p>
+          <a:p>
+            <a:endParaRPr lang="en-US" altLang="ko-KR" dirty="0"/>
+          </a:p>
+          <a:p>
+            <a:endParaRPr lang="en-US" altLang="ko-KR" dirty="0"/>
+          </a:p>
+          <a:p>
+            <a:r>
+              <a:rPr lang="en-US" altLang="ko-KR" dirty="0"/>
+              <a:t>Gradient Descent</a:t>
+            </a:r>
+            <a:r>
+              <a:rPr lang="ko-KR" altLang="en-US" dirty="0"/>
+              <a:t>를 통해 이동하는 과정에 </a:t>
+            </a:r>
+            <a:r>
+              <a:rPr lang="en-US" altLang="ko-KR" dirty="0"/>
+              <a:t>‘</a:t>
+            </a:r>
+            <a:r>
+              <a:rPr lang="ko-KR" altLang="en-US" dirty="0"/>
+              <a:t>관성</a:t>
+            </a:r>
+            <a:r>
+              <a:rPr lang="en-US" altLang="ko-KR" dirty="0"/>
+              <a:t>’</a:t>
+            </a:r>
+            <a:r>
+              <a:rPr lang="ko-KR" altLang="en-US" dirty="0"/>
+              <a:t>을 주는 것</a:t>
+            </a:r>
+            <a:r>
+              <a:rPr lang="en-US" altLang="ko-KR" dirty="0"/>
+              <a:t>.</a:t>
+            </a:r>
+          </a:p>
+          <a:p>
+            <a:r>
+              <a:rPr lang="ko-KR" altLang="en-US" dirty="0"/>
+              <a:t>과거에 이동했던 방식을 기억</a:t>
+            </a:r>
+            <a:r>
+              <a:rPr lang="en-US" altLang="ko-KR" dirty="0"/>
+              <a:t>.</a:t>
+            </a:r>
+          </a:p>
+          <a:p>
+            <a:r>
+              <a:rPr lang="ko-KR" altLang="en-US" dirty="0"/>
+              <a:t>그 방향으로 일정 정도를 추가적으로 이동한다</a:t>
+            </a:r>
+            <a:r>
+              <a:rPr lang="en-US" altLang="ko-KR" dirty="0"/>
+              <a:t>.</a:t>
+            </a:r>
+          </a:p>
+          <a:p>
+            <a:r>
+              <a:rPr lang="en-US" altLang="ko-KR" dirty="0"/>
+              <a:t>local minima</a:t>
+            </a:r>
+            <a:r>
+              <a:rPr lang="ko-KR" altLang="en-US" dirty="0"/>
+              <a:t>를 빠져 나올 수 도 있다</a:t>
+            </a:r>
+            <a:r>
+              <a:rPr lang="en-US" altLang="ko-KR" dirty="0"/>
+              <a:t>.</a:t>
+            </a:r>
+          </a:p>
+          <a:p>
+            <a:endParaRPr lang="en-US" altLang="ko-KR" dirty="0"/>
+          </a:p>
+          <a:p>
+            <a:endParaRPr lang="ko-KR" altLang="en-US" dirty="0"/>
+          </a:p>
+        </p:txBody>
+      </p:sp>
+      <p:pic>
+        <p:nvPicPr>
+          <p:cNvPr id="7" name="그림 6">
+            <a:extLst>
+              <a:ext uri="{FF2B5EF4-FFF2-40B4-BE49-F238E27FC236}">
+                <a16:creationId xmlns:a16="http://schemas.microsoft.com/office/drawing/2014/main" id="{9ED2ED9A-75E7-4325-BD9A-A859AA93AFD2}"/>
+              </a:ext>
+            </a:extLst>
+          </p:cNvPr>
+          <p:cNvPicPr>
+            <a:picLocks noChangeAspect="1"/>
+          </p:cNvPicPr>
+          <p:nvPr/>
+        </p:nvPicPr>
+        <p:blipFill>
+          <a:blip r:embed="rId2"/>
+          <a:stretch>
+            <a:fillRect/>
+          </a:stretch>
+        </p:blipFill>
+        <p:spPr>
+          <a:xfrm>
+            <a:off x="1097280" y="1845734"/>
+            <a:ext cx="3154448" cy="1237380"/>
+          </a:xfrm>
+          <a:prstGeom prst="rect">
+            <a:avLst/>
+          </a:prstGeom>
+        </p:spPr>
+      </p:pic>
+      <p:grpSp>
+        <p:nvGrpSpPr>
+          <p:cNvPr id="9" name="그룹 8">
+            <a:extLst>
+              <a:ext uri="{FF2B5EF4-FFF2-40B4-BE49-F238E27FC236}">
+                <a16:creationId xmlns:a16="http://schemas.microsoft.com/office/drawing/2014/main" id="{6C4216E9-4DF6-4EF9-817C-5E62900D4D5A}"/>
+              </a:ext>
+            </a:extLst>
+          </p:cNvPr>
+          <p:cNvGrpSpPr/>
+          <p:nvPr/>
+        </p:nvGrpSpPr>
+        <p:grpSpPr>
+          <a:xfrm>
+            <a:off x="8188086" y="2446933"/>
+            <a:ext cx="2967594" cy="3012249"/>
+            <a:chOff x="8085970" y="2376279"/>
+            <a:chExt cx="2967594" cy="3012249"/>
+          </a:xfrm>
+        </p:grpSpPr>
+        <p:pic>
+          <p:nvPicPr>
+            <p:cNvPr id="2051" name="Picture 3" descr="Oscilation">
+              <a:extLst>
+                <a:ext uri="{FF2B5EF4-FFF2-40B4-BE49-F238E27FC236}">
+                  <a16:creationId xmlns:a16="http://schemas.microsoft.com/office/drawing/2014/main" id="{A493D992-0C44-4B5A-BAE8-58A9DD1ADBCF}"/>
+                </a:ext>
+              </a:extLst>
+            </p:cNvPr>
+            <p:cNvPicPr>
+              <a:picLocks noChangeAspect="1" noChangeArrowheads="1"/>
+            </p:cNvPicPr>
+            <p:nvPr/>
+          </p:nvPicPr>
+          <p:blipFill>
+            <a:blip r:embed="rId3">
+              <a:extLst>
+                <a:ext uri="{28A0092B-C50C-407E-A947-70E740481C1C}">
+                  <a14:useLocalDpi xmlns:a14="http://schemas.microsoft.com/office/drawing/2010/main" val="0"/>
+                </a:ext>
+              </a:extLst>
+            </a:blip>
+            <a:srcRect/>
+            <a:stretch>
+              <a:fillRect/>
+            </a:stretch>
+          </p:blipFill>
+          <p:spPr bwMode="auto">
+            <a:xfrm>
+              <a:off x="8085970" y="2376279"/>
+              <a:ext cx="2967594" cy="1259418"/>
+            </a:xfrm>
+            <a:prstGeom prst="rect">
+              <a:avLst/>
+            </a:prstGeom>
+            <a:noFill/>
+            <a:extLst>
+              <a:ext uri="{909E8E84-426E-40DD-AFC4-6F175D3DCCD1}">
+                <a14:hiddenFill xmlns:a14="http://schemas.microsoft.com/office/drawing/2010/main">
+                  <a:solidFill>
+                    <a:srgbClr val="FFFFFF"/>
+                  </a:solidFill>
+                </a14:hiddenFill>
+              </a:ext>
+            </a:extLst>
+          </p:spPr>
+        </p:pic>
+        <p:pic>
+          <p:nvPicPr>
+            <p:cNvPr id="2053" name="Picture 5" descr="Momentum Oscilation">
+              <a:extLst>
+                <a:ext uri="{FF2B5EF4-FFF2-40B4-BE49-F238E27FC236}">
+                  <a16:creationId xmlns:a16="http://schemas.microsoft.com/office/drawing/2014/main" id="{00BF6BD2-64DB-482F-8A8B-3366CD1ECCAF}"/>
+                </a:ext>
+              </a:extLst>
+            </p:cNvPr>
+            <p:cNvPicPr>
+              <a:picLocks noChangeAspect="1" noChangeArrowheads="1"/>
+            </p:cNvPicPr>
+            <p:nvPr/>
+          </p:nvPicPr>
+          <p:blipFill>
+            <a:blip r:embed="rId4">
+              <a:extLst>
+                <a:ext uri="{28A0092B-C50C-407E-A947-70E740481C1C}">
+                  <a14:useLocalDpi xmlns:a14="http://schemas.microsoft.com/office/drawing/2010/main" val="0"/>
+                </a:ext>
+              </a:extLst>
+            </a:blip>
+            <a:srcRect/>
+            <a:stretch>
+              <a:fillRect/>
+            </a:stretch>
+          </p:blipFill>
+          <p:spPr bwMode="auto">
+            <a:xfrm>
+              <a:off x="8085970" y="4129110"/>
+              <a:ext cx="2967594" cy="1259418"/>
+            </a:xfrm>
+            <a:prstGeom prst="rect">
+              <a:avLst/>
+            </a:prstGeom>
+            <a:noFill/>
+            <a:extLst>
+              <a:ext uri="{909E8E84-426E-40DD-AFC4-6F175D3DCCD1}">
+                <a14:hiddenFill xmlns:a14="http://schemas.microsoft.com/office/drawing/2010/main">
+                  <a:solidFill>
+                    <a:srgbClr val="FFFFFF"/>
+                  </a:solidFill>
+                </a14:hiddenFill>
+              </a:ext>
+            </a:extLst>
+          </p:spPr>
+        </p:pic>
+        <p:sp>
+          <p:nvSpPr>
+            <p:cNvPr id="8" name="화살표: 오른쪽 7">
+              <a:extLst>
+                <a:ext uri="{FF2B5EF4-FFF2-40B4-BE49-F238E27FC236}">
+                  <a16:creationId xmlns:a16="http://schemas.microsoft.com/office/drawing/2014/main" id="{C376FB79-932F-4996-A0C4-6411CEC559D0}"/>
+                </a:ext>
+              </a:extLst>
+            </p:cNvPr>
+            <p:cNvSpPr/>
+            <p:nvPr/>
+          </p:nvSpPr>
+          <p:spPr>
+            <a:xfrm rot="5400000">
+              <a:off x="9345301" y="3673199"/>
+              <a:ext cx="448932" cy="418408"/>
+            </a:xfrm>
+            <a:prstGeom prst="rightArrow">
+              <a:avLst/>
+            </a:prstGeom>
+            <a:noFill/>
+            <a:ln w="28575">
+              <a:solidFill>
+                <a:schemeClr val="tx1"/>
+              </a:solidFill>
+            </a:ln>
+          </p:spPr>
+          <p:style>
+            <a:lnRef idx="2">
+              <a:schemeClr val="accent1">
+                <a:shade val="50000"/>
+              </a:schemeClr>
+            </a:lnRef>
+            <a:fillRef idx="1">
+              <a:schemeClr val="accent1"/>
+            </a:fillRef>
+            <a:effectRef idx="0">
+              <a:schemeClr val="accent1"/>
+            </a:effectRef>
+            <a:fontRef idx="minor">
+              <a:schemeClr val="lt1"/>
+            </a:fontRef>
+          </p:style>
+          <p:txBody>
+            <a:bodyPr rtlCol="0" anchor="ctr"/>
+            <a:lstStyle/>
+            <a:p>
+              <a:pPr algn="ctr"/>
+              <a:endParaRPr lang="ko-KR" altLang="en-US"/>
+            </a:p>
+          </p:txBody>
+        </p:sp>
+      </p:grpSp>
+    </p:spTree>
+    <p:extLst>
+      <p:ext uri="{BB962C8B-B14F-4D97-AF65-F5344CB8AC3E}">
+        <p14:creationId xmlns:p14="http://schemas.microsoft.com/office/powerpoint/2010/main" val="163898022"/>
+      </p:ext>
+    </p:extLst>
+  </p:cSld>
+  <p:clrMapOvr>
+    <a:masterClrMapping/>
+  </p:clrMapOvr>
+</p:sld>
+</file>
+
+<file path=ppt/slides/slide33.xml><?xml version="1.0" encoding="utf-8"?>
+<p:sld xmlns:a="http://schemas.openxmlformats.org/drawingml/2006/main" xmlns:r="http://schemas.openxmlformats.org/officeDocument/2006/relationships" xmlns:p="http://schemas.openxmlformats.org/presentationml/2006/main">
+  <p:cSld>
+    <p:spTree>
+      <p:nvGrpSpPr>
+        <p:cNvPr id="1" name=""/>
+        <p:cNvGrpSpPr/>
+        <p:nvPr/>
+      </p:nvGrpSpPr>
+      <p:grpSpPr>
+        <a:xfrm>
+          <a:off x="0" y="0"/>
+          <a:ext cx="0" cy="0"/>
+          <a:chOff x="0" y="0"/>
+          <a:chExt cx="0" cy="0"/>
+        </a:xfrm>
+      </p:grpSpPr>
+      <p:sp>
+        <p:nvSpPr>
+          <p:cNvPr id="2" name="제목 1">
+            <a:extLst>
+              <a:ext uri="{FF2B5EF4-FFF2-40B4-BE49-F238E27FC236}">
+                <a16:creationId xmlns:a16="http://schemas.microsoft.com/office/drawing/2014/main" id="{89B687D0-EFF0-44E2-94B1-89E2D1470840}"/>
+              </a:ext>
+            </a:extLst>
+          </p:cNvPr>
+          <p:cNvSpPr>
+            <a:spLocks noGrp="1"/>
+          </p:cNvSpPr>
+          <p:nvPr>
+            <p:ph type="title"/>
+          </p:nvPr>
+        </p:nvSpPr>
+        <p:spPr/>
+        <p:txBody>
+          <a:bodyPr>
+            <a:normAutofit/>
+          </a:bodyPr>
+          <a:lstStyle/>
+          <a:p>
+            <a:r>
+              <a:rPr lang="en-US" altLang="ko-KR" dirty="0"/>
+              <a:t>Optimizer – Adam</a:t>
+            </a:r>
+            <a:endParaRPr lang="ko-KR" altLang="en-US" dirty="0"/>
+          </a:p>
+        </p:txBody>
+      </p:sp>
+      <p:pic>
+        <p:nvPicPr>
+          <p:cNvPr id="3" name="그림 2">
+            <a:extLst>
+              <a:ext uri="{FF2B5EF4-FFF2-40B4-BE49-F238E27FC236}">
+                <a16:creationId xmlns:a16="http://schemas.microsoft.com/office/drawing/2014/main" id="{7B97DD73-6487-4BD7-B2F7-C2EDADC4AF67}"/>
+              </a:ext>
+            </a:extLst>
+          </p:cNvPr>
+          <p:cNvPicPr>
+            <a:picLocks noChangeAspect="1"/>
+          </p:cNvPicPr>
+          <p:nvPr/>
+        </p:nvPicPr>
+        <p:blipFill>
+          <a:blip r:embed="rId2"/>
+          <a:stretch>
+            <a:fillRect/>
+          </a:stretch>
+        </p:blipFill>
+        <p:spPr>
+          <a:xfrm>
+            <a:off x="1097280" y="1845734"/>
+            <a:ext cx="4500519" cy="1286977"/>
+          </a:xfrm>
+          <a:prstGeom prst="rect">
+            <a:avLst/>
+          </a:prstGeom>
+        </p:spPr>
+      </p:pic>
+      <p:pic>
+        <p:nvPicPr>
+          <p:cNvPr id="6" name="그림 5">
+            <a:extLst>
+              <a:ext uri="{FF2B5EF4-FFF2-40B4-BE49-F238E27FC236}">
+                <a16:creationId xmlns:a16="http://schemas.microsoft.com/office/drawing/2014/main" id="{455C8151-35DC-4A02-ABAC-91AD1EAAF892}"/>
+              </a:ext>
+            </a:extLst>
+          </p:cNvPr>
+          <p:cNvPicPr>
+            <a:picLocks noChangeAspect="1"/>
+          </p:cNvPicPr>
+          <p:nvPr/>
+        </p:nvPicPr>
+        <p:blipFill>
+          <a:blip r:embed="rId3"/>
+          <a:stretch>
+            <a:fillRect/>
+          </a:stretch>
+        </p:blipFill>
+        <p:spPr>
+          <a:xfrm>
+            <a:off x="1097280" y="3132711"/>
+            <a:ext cx="2691262" cy="2512303"/>
+          </a:xfrm>
+          <a:prstGeom prst="rect">
+            <a:avLst/>
+          </a:prstGeom>
+        </p:spPr>
+      </p:pic>
+      <p:sp>
+        <p:nvSpPr>
+          <p:cNvPr id="10" name="내용 개체 틀 9">
+            <a:extLst>
+              <a:ext uri="{FF2B5EF4-FFF2-40B4-BE49-F238E27FC236}">
+                <a16:creationId xmlns:a16="http://schemas.microsoft.com/office/drawing/2014/main" id="{06283EEA-3784-419F-96B9-AFB965B4B577}"/>
+              </a:ext>
+            </a:extLst>
+          </p:cNvPr>
+          <p:cNvSpPr>
+            <a:spLocks noGrp="1"/>
+          </p:cNvSpPr>
+          <p:nvPr>
+            <p:ph idx="1"/>
+          </p:nvPr>
+        </p:nvSpPr>
+        <p:spPr>
+          <a:xfrm>
+            <a:off x="5774180" y="1845734"/>
+            <a:ext cx="5381499" cy="4023360"/>
+          </a:xfrm>
+        </p:spPr>
+        <p:txBody>
+          <a:bodyPr/>
+          <a:lstStyle/>
+          <a:p>
+            <a:r>
+              <a:rPr lang="ko-KR" altLang="en-US" dirty="0"/>
+              <a:t>이해가 아직</a:t>
+            </a:r>
+            <a:r>
+              <a:rPr lang="en-US" altLang="ko-KR" dirty="0"/>
+              <a:t>….</a:t>
+            </a:r>
+          </a:p>
+          <a:p>
+            <a:r>
+              <a:rPr lang="en-US" altLang="ko-KR" dirty="0"/>
+              <a:t>To be updated</a:t>
+            </a:r>
+          </a:p>
+          <a:p>
+            <a:r>
+              <a:rPr lang="en-US" altLang="ko-KR" dirty="0"/>
+              <a:t>Or</a:t>
+            </a:r>
+          </a:p>
+          <a:p>
+            <a:r>
+              <a:rPr lang="en-US" altLang="ko-KR" dirty="0"/>
+              <a:t>Delete</a:t>
+            </a:r>
+          </a:p>
+          <a:p>
+            <a:endParaRPr lang="ko-KR" altLang="en-US" dirty="0"/>
+          </a:p>
+        </p:txBody>
+      </p:sp>
+    </p:spTree>
+    <p:extLst>
+      <p:ext uri="{BB962C8B-B14F-4D97-AF65-F5344CB8AC3E}">
+        <p14:creationId xmlns:p14="http://schemas.microsoft.com/office/powerpoint/2010/main" val="3567647948"/>
+      </p:ext>
+    </p:extLst>
+  </p:cSld>
+  <p:clrMapOvr>
+    <a:masterClrMapping/>
+  </p:clrMapOvr>
+</p:sld>
+</file>
+
+<file path=ppt/slides/slide34.xml><?xml version="1.0" encoding="utf-8"?>
+<p:sld xmlns:a="http://schemas.openxmlformats.org/drawingml/2006/main" xmlns:r="http://schemas.openxmlformats.org/officeDocument/2006/relationships" xmlns:p="http://schemas.openxmlformats.org/presentationml/2006/main">
+  <p:cSld>
+    <p:spTree>
+      <p:nvGrpSpPr>
+        <p:cNvPr id="1" name=""/>
+        <p:cNvGrpSpPr/>
+        <p:nvPr/>
+      </p:nvGrpSpPr>
+      <p:grpSpPr>
+        <a:xfrm>
+          <a:off x="0" y="0"/>
+          <a:ext cx="0" cy="0"/>
+          <a:chOff x="0" y="0"/>
+          <a:chExt cx="0" cy="0"/>
+        </a:xfrm>
+      </p:grpSpPr>
+      <p:sp>
+        <p:nvSpPr>
+          <p:cNvPr id="2" name="제목 1">
+            <a:extLst>
+              <a:ext uri="{FF2B5EF4-FFF2-40B4-BE49-F238E27FC236}">
+                <a16:creationId xmlns:a16="http://schemas.microsoft.com/office/drawing/2014/main" id="{67278C35-DBEC-42E9-A1DE-838447B9C588}"/>
+              </a:ext>
+            </a:extLst>
+          </p:cNvPr>
+          <p:cNvSpPr>
+            <a:spLocks noGrp="1"/>
+          </p:cNvSpPr>
+          <p:nvPr>
+            <p:ph type="title"/>
+          </p:nvPr>
+        </p:nvSpPr>
+        <p:spPr/>
+        <p:txBody>
+          <a:bodyPr/>
+          <a:lstStyle/>
+          <a:p>
+            <a:r>
+              <a:rPr lang="en-US" altLang="ko-KR" dirty="0"/>
+              <a:t>Feed Forward neural network?</a:t>
+            </a:r>
+            <a:endParaRPr lang="ko-KR" altLang="en-US" dirty="0"/>
+          </a:p>
+        </p:txBody>
+      </p:sp>
+      <p:sp>
+        <p:nvSpPr>
+          <p:cNvPr id="3" name="내용 개체 틀 2">
+            <a:extLst>
+              <a:ext uri="{FF2B5EF4-FFF2-40B4-BE49-F238E27FC236}">
+                <a16:creationId xmlns:a16="http://schemas.microsoft.com/office/drawing/2014/main" id="{851004CC-E0DB-4FD8-91C3-DD38DA297004}"/>
+              </a:ext>
+            </a:extLst>
+          </p:cNvPr>
+          <p:cNvSpPr>
+            <a:spLocks noGrp="1"/>
+          </p:cNvSpPr>
+          <p:nvPr>
+            <p:ph idx="1"/>
+          </p:nvPr>
+        </p:nvSpPr>
+        <p:spPr/>
+        <p:txBody>
+          <a:bodyPr/>
+          <a:lstStyle/>
+          <a:p>
+            <a:r>
+              <a:rPr lang="en-US" altLang="ko-KR" dirty="0"/>
+              <a:t>MLP?</a:t>
+            </a:r>
+            <a:endParaRPr lang="ko-KR" altLang="en-US" dirty="0"/>
+          </a:p>
+        </p:txBody>
+      </p:sp>
+    </p:spTree>
+    <p:extLst>
+      <p:ext uri="{BB962C8B-B14F-4D97-AF65-F5344CB8AC3E}">
+        <p14:creationId xmlns:p14="http://schemas.microsoft.com/office/powerpoint/2010/main" val="3020366197"/>
+      </p:ext>
+    </p:extLst>
+  </p:cSld>
+  <p:clrMapOvr>
+    <a:masterClrMapping/>
+  </p:clrMapOvr>
+</p:sld>
+</file>
+
+<file path=ppt/slides/slide35.xml><?xml version="1.0" encoding="utf-8"?>
+<p:sld xmlns:a="http://schemas.openxmlformats.org/drawingml/2006/main" xmlns:r="http://schemas.openxmlformats.org/officeDocument/2006/relationships" xmlns:p="http://schemas.openxmlformats.org/presentationml/2006/main">
+  <p:cSld>
+    <p:spTree>
+      <p:nvGrpSpPr>
+        <p:cNvPr id="1" name=""/>
+        <p:cNvGrpSpPr/>
+        <p:nvPr/>
+      </p:nvGrpSpPr>
+      <p:grpSpPr>
+        <a:xfrm>
+          <a:off x="0" y="0"/>
+          <a:ext cx="0" cy="0"/>
+          <a:chOff x="0" y="0"/>
+          <a:chExt cx="0" cy="0"/>
+        </a:xfrm>
+      </p:grpSpPr>
+      <p:sp>
+        <p:nvSpPr>
+          <p:cNvPr id="2" name="제목 1">
+            <a:extLst>
+              <a:ext uri="{FF2B5EF4-FFF2-40B4-BE49-F238E27FC236}">
+                <a16:creationId xmlns:a16="http://schemas.microsoft.com/office/drawing/2014/main" id="{2DA563D9-E1F5-4582-972A-0398E70260C2}"/>
+              </a:ext>
+            </a:extLst>
+          </p:cNvPr>
+          <p:cNvSpPr>
+            <a:spLocks noGrp="1"/>
+          </p:cNvSpPr>
+          <p:nvPr>
+            <p:ph type="title"/>
+          </p:nvPr>
+        </p:nvSpPr>
+        <p:spPr/>
+        <p:txBody>
+          <a:bodyPr/>
+          <a:lstStyle/>
+          <a:p>
+            <a:r>
+              <a:rPr lang="ko-KR" altLang="en-US" dirty="0"/>
+              <a:t>여러 기법 </a:t>
+            </a:r>
+            <a:r>
+              <a:rPr lang="en-US" altLang="ko-KR" dirty="0"/>
+              <a:t>ex dropout</a:t>
+            </a:r>
+            <a:endParaRPr lang="ko-KR" altLang="en-US" dirty="0"/>
+          </a:p>
+        </p:txBody>
+      </p:sp>
+      <p:sp>
+        <p:nvSpPr>
+          <p:cNvPr id="3" name="내용 개체 틀 2">
+            <a:extLst>
+              <a:ext uri="{FF2B5EF4-FFF2-40B4-BE49-F238E27FC236}">
+                <a16:creationId xmlns:a16="http://schemas.microsoft.com/office/drawing/2014/main" id="{6DA91EE2-FD7E-4BF8-BD02-4E9B2916C531}"/>
+              </a:ext>
+            </a:extLst>
+          </p:cNvPr>
+          <p:cNvSpPr>
+            <a:spLocks noGrp="1"/>
+          </p:cNvSpPr>
+          <p:nvPr>
+            <p:ph idx="1"/>
+          </p:nvPr>
+        </p:nvSpPr>
+        <p:spPr/>
+        <p:txBody>
+          <a:bodyPr/>
+          <a:lstStyle/>
+          <a:p>
+            <a:r>
+              <a:rPr lang="en-US" altLang="ko-KR" dirty="0" err="1"/>
+              <a:t>Minist</a:t>
+            </a:r>
+            <a:r>
+              <a:rPr lang="ko-KR" altLang="en-US" dirty="0"/>
+              <a:t> 향상 시키는 쪽으로 설명</a:t>
+            </a:r>
+            <a:endParaRPr lang="en-US" altLang="ko-KR" dirty="0"/>
+          </a:p>
+          <a:p>
+            <a:r>
+              <a:rPr lang="en-US" altLang="ko-KR" dirty="0"/>
+              <a:t>https://docs.google.com/presentation/d/1fuOqBNMLgUskKUzpEEDVPXrsByEGBpXW-zpHxyl-haY/edit#slide=id.g1ed84ee29f_0_0</a:t>
+            </a:r>
+            <a:endParaRPr lang="ko-KR" altLang="en-US" dirty="0"/>
+          </a:p>
+        </p:txBody>
+      </p:sp>
+    </p:spTree>
+    <p:extLst>
+      <p:ext uri="{BB962C8B-B14F-4D97-AF65-F5344CB8AC3E}">
+        <p14:creationId xmlns:p14="http://schemas.microsoft.com/office/powerpoint/2010/main" val="357180034"/>
+      </p:ext>
+    </p:extLst>
+  </p:cSld>
+  <p:clrMapOvr>
+    <a:masterClrMapping/>
+  </p:clrMapOvr>
+</p:sld>
+</file>
+
+<file path=ppt/slides/slide36.xml><?xml version="1.0" encoding="utf-8"?>
+<p:sld xmlns:a="http://schemas.openxmlformats.org/drawingml/2006/main" xmlns:r="http://schemas.openxmlformats.org/officeDocument/2006/relationships" xmlns:p="http://schemas.openxmlformats.org/presentationml/2006/main">
+  <p:cSld>
+    <p:spTree>
+      <p:nvGrpSpPr>
+        <p:cNvPr id="1" name=""/>
+        <p:cNvGrpSpPr/>
+        <p:nvPr/>
+      </p:nvGrpSpPr>
+      <p:grpSpPr>
+        <a:xfrm>
+          <a:off x="0" y="0"/>
+          <a:ext cx="0" cy="0"/>
+          <a:chOff x="0" y="0"/>
+          <a:chExt cx="0" cy="0"/>
+        </a:xfrm>
+      </p:grpSpPr>
+      <p:sp>
+        <p:nvSpPr>
+          <p:cNvPr id="2" name="제목 1">
+            <a:extLst>
+              <a:ext uri="{FF2B5EF4-FFF2-40B4-BE49-F238E27FC236}">
+                <a16:creationId xmlns:a16="http://schemas.microsoft.com/office/drawing/2014/main" id="{8674F636-0B63-43EC-8557-15BD68727D1F}"/>
+              </a:ext>
+            </a:extLst>
+          </p:cNvPr>
+          <p:cNvSpPr>
+            <a:spLocks noGrp="1"/>
+          </p:cNvSpPr>
+          <p:nvPr>
+            <p:ph type="title"/>
+          </p:nvPr>
+        </p:nvSpPr>
+        <p:spPr/>
+        <p:txBody>
+          <a:bodyPr/>
+          <a:lstStyle/>
+          <a:p>
+            <a:r>
+              <a:rPr lang="ko-KR" altLang="en-US" dirty="0"/>
+              <a:t>예시 </a:t>
+            </a:r>
+            <a:r>
+              <a:rPr lang="en-US" altLang="ko-KR" dirty="0"/>
+              <a:t>– </a:t>
+            </a:r>
+            <a:r>
+              <a:rPr lang="en-US" altLang="ko-KR" dirty="0" err="1"/>
+              <a:t>minist</a:t>
+            </a:r>
+            <a:endParaRPr lang="ko-KR" altLang="en-US" dirty="0"/>
+          </a:p>
+        </p:txBody>
+      </p:sp>
+      <p:sp>
+        <p:nvSpPr>
+          <p:cNvPr id="3" name="내용 개체 틀 2">
+            <a:extLst>
+              <a:ext uri="{FF2B5EF4-FFF2-40B4-BE49-F238E27FC236}">
+                <a16:creationId xmlns:a16="http://schemas.microsoft.com/office/drawing/2014/main" id="{29CE6F6F-E2B4-4D11-BE64-30F6514A8DA4}"/>
+              </a:ext>
+            </a:extLst>
+          </p:cNvPr>
+          <p:cNvSpPr>
+            <a:spLocks noGrp="1"/>
+          </p:cNvSpPr>
+          <p:nvPr>
+            <p:ph idx="1"/>
+          </p:nvPr>
+        </p:nvSpPr>
+        <p:spPr/>
+        <p:txBody>
+          <a:bodyPr/>
+          <a:lstStyle/>
+          <a:p>
+            <a:r>
+              <a:rPr lang="en-US" altLang="ko-KR" dirty="0"/>
+              <a:t>To </a:t>
+            </a:r>
+            <a:r>
+              <a:rPr lang="en-US" altLang="ko-KR"/>
+              <a:t>be updated</a:t>
+            </a:r>
+            <a:endParaRPr lang="ko-KR" altLang="en-US"/>
+          </a:p>
+        </p:txBody>
+      </p:sp>
+    </p:spTree>
+    <p:extLst>
+      <p:ext uri="{BB962C8B-B14F-4D97-AF65-F5344CB8AC3E}">
+        <p14:creationId xmlns:p14="http://schemas.microsoft.com/office/powerpoint/2010/main" val="4209023559"/>
+      </p:ext>
+    </p:extLst>
+  </p:cSld>
+  <p:clrMapOvr>
+    <a:masterClrMapping/>
+  </p:clrMapOvr>
+</p:sld>
+</file>
+
+<file path=ppt/slides/slide4.xml><?xml version="1.0" encoding="utf-8"?>
 <p:sld xmlns:a="http://schemas.openxmlformats.org/drawingml/2006/main" xmlns:r="http://schemas.openxmlformats.org/officeDocument/2006/relationships" xmlns:p="http://schemas.openxmlformats.org/presentationml/2006/main">
   <p:cSld>
     <p:spTree>
@@ -16546,7 +17871,7 @@
 </p:sld>
 </file>
 
-<file path=ppt/slides/slide6.xml><?xml version="1.0" encoding="utf-8"?>
+<file path=ppt/slides/slide5.xml><?xml version="1.0" encoding="utf-8"?>
 <p:sld xmlns:a="http://schemas.openxmlformats.org/drawingml/2006/main" xmlns:r="http://schemas.openxmlformats.org/officeDocument/2006/relationships" xmlns:p="http://schemas.openxmlformats.org/presentationml/2006/main">
   <p:cSld>
     <p:spTree>
@@ -16586,8 +17911,13 @@
           <a:p>
             <a:r>
               <a:rPr lang="ko-KR" altLang="en-US" dirty="0"/>
-              <a:t>학습 알고리즘</a:t>
-            </a:r>
+              <a:t>학습 알고리즘 </a:t>
+            </a:r>
+            <a:r>
+              <a:rPr lang="en-US" altLang="ko-KR" dirty="0"/>
+              <a:t>– Delta Rule</a:t>
+            </a:r>
+            <a:endParaRPr lang="ko-KR" altLang="en-US" dirty="0"/>
           </a:p>
         </p:txBody>
       </p:sp>
@@ -16609,8 +17939,39 @@
         </p:nvSpPr>
         <p:spPr/>
         <p:txBody>
-          <a:bodyPr/>
+          <a:bodyPr>
+            <a:normAutofit/>
+          </a:bodyPr>
           <a:lstStyle/>
+          <a:p>
+            <a:r>
+              <a:rPr lang="ko-KR" altLang="en-US" dirty="0"/>
+              <a:t>출력 값이 우리가 원하는 목표 값</a:t>
+            </a:r>
+            <a:r>
+              <a:rPr lang="en-US" altLang="ko-KR" dirty="0"/>
+              <a:t>(d)</a:t>
+            </a:r>
+            <a:r>
+              <a:rPr lang="ko-KR" altLang="en-US" dirty="0"/>
+              <a:t>과 가까워지도록 가중치를 </a:t>
+            </a:r>
+            <a:r>
+              <a:rPr lang="en-US" altLang="ko-KR" dirty="0"/>
+              <a:t>Gradient Descent</a:t>
+            </a:r>
+            <a:r>
+              <a:rPr lang="ko-KR" altLang="en-US" dirty="0"/>
+              <a:t>를 이용하여 조정</a:t>
+            </a:r>
+            <a:r>
+              <a:rPr lang="en-US" altLang="ko-KR" dirty="0"/>
+              <a:t>.</a:t>
+            </a:r>
+          </a:p>
+          <a:p>
+            <a:endParaRPr lang="en-US" altLang="ko-KR" dirty="0"/>
+          </a:p>
           <a:p>
             <a:r>
               <a:rPr lang="en-US" altLang="ko-KR" dirty="0"/>
@@ -16703,7 +18064,7 @@
 </p:sld>
 </file>
 
-<file path=ppt/slides/slide7.xml><?xml version="1.0" encoding="utf-8"?>
+<file path=ppt/slides/slide6.xml><?xml version="1.0" encoding="utf-8"?>
 <p:sld xmlns:a="http://schemas.openxmlformats.org/drawingml/2006/main" xmlns:r="http://schemas.openxmlformats.org/officeDocument/2006/relationships" xmlns:p="http://schemas.openxmlformats.org/presentationml/2006/main">
   <p:cSld>
     <p:spTree>
@@ -16858,8 +18219,8 @@
             </a:p>
           </p:txBody>
         </p:sp>
-        <mc:AlternateContent xmlns:mc="http://schemas.openxmlformats.org/markup-compatibility/2006">
-          <mc:Choice xmlns:a14="http://schemas.microsoft.com/office/drawing/2010/main" Requires="a14">
+        <mc:AlternateContent xmlns:mc="http://schemas.openxmlformats.org/markup-compatibility/2006" xmlns:a14="http://schemas.microsoft.com/office/drawing/2010/main">
+          <mc:Choice Requires="a14">
             <p:sp>
               <p:nvSpPr>
                 <p:cNvPr id="8" name="직사각형 7">
@@ -17067,7 +18428,7 @@
               </p:txBody>
             </p:sp>
           </mc:Choice>
-          <mc:Fallback>
+          <mc:Fallback xmlns="">
             <p:sp>
               <p:nvSpPr>
                 <p:cNvPr id="8" name="직사각형 7">
@@ -17751,7 +19112,7 @@
 </p:sld>
 </file>
 
-<file path=ppt/slides/slide8.xml><?xml version="1.0" encoding="utf-8"?>
+<file path=ppt/slides/slide7.xml><?xml version="1.0" encoding="utf-8"?>
 <p:sld xmlns:a="http://schemas.openxmlformats.org/drawingml/2006/main" xmlns:r="http://schemas.openxmlformats.org/officeDocument/2006/relationships" xmlns:p="http://schemas.openxmlformats.org/presentationml/2006/main">
   <p:cSld>
     <p:spTree>
@@ -17800,8 +19161,8 @@
           </a:p>
         </p:txBody>
       </p:sp>
-      <mc:AlternateContent xmlns:mc="http://schemas.openxmlformats.org/markup-compatibility/2006">
-        <mc:Choice xmlns:a14="http://schemas.microsoft.com/office/drawing/2010/main" Requires="a14">
+      <mc:AlternateContent xmlns:mc="http://schemas.openxmlformats.org/markup-compatibility/2006" xmlns:a14="http://schemas.microsoft.com/office/drawing/2010/main">
+        <mc:Choice Requires="a14">
           <p:sp>
             <p:nvSpPr>
               <p:cNvPr id="3" name="내용 개체 틀 2">
@@ -18323,7 +19684,7 @@
             </p:txBody>
           </p:sp>
         </mc:Choice>
-        <mc:Fallback>
+        <mc:Fallback xmlns="">
           <p:sp>
             <p:nvSpPr>
               <p:cNvPr id="3" name="내용 개체 틀 2">
@@ -18376,7 +19737,7 @@
 </p:sld>
 </file>
 
-<file path=ppt/slides/slide9.xml><?xml version="1.0" encoding="utf-8"?>
+<file path=ppt/slides/slide8.xml><?xml version="1.0" encoding="utf-8"?>
 <p:sld xmlns:a="http://schemas.openxmlformats.org/drawingml/2006/main" xmlns:r="http://schemas.openxmlformats.org/officeDocument/2006/relationships" xmlns:p="http://schemas.openxmlformats.org/presentationml/2006/main">
   <p:cSld>
     <p:spTree>
@@ -18813,6 +20174,92 @@
     <p:extLst>
       <p:ext uri="{BB962C8B-B14F-4D97-AF65-F5344CB8AC3E}">
         <p14:creationId xmlns:p14="http://schemas.microsoft.com/office/powerpoint/2010/main" val="346584146"/>
+      </p:ext>
+    </p:extLst>
+  </p:cSld>
+  <p:clrMapOvr>
+    <a:masterClrMapping/>
+  </p:clrMapOvr>
+</p:sld>
+</file>
+
+<file path=ppt/slides/slide9.xml><?xml version="1.0" encoding="utf-8"?>
+<p:sld xmlns:a="http://schemas.openxmlformats.org/drawingml/2006/main" xmlns:r="http://schemas.openxmlformats.org/officeDocument/2006/relationships" xmlns:p="http://schemas.openxmlformats.org/presentationml/2006/main">
+  <p:cSld>
+    <p:spTree>
+      <p:nvGrpSpPr>
+        <p:cNvPr id="1" name=""/>
+        <p:cNvGrpSpPr/>
+        <p:nvPr/>
+      </p:nvGrpSpPr>
+      <p:grpSpPr>
+        <a:xfrm>
+          <a:off x="0" y="0"/>
+          <a:ext cx="0" cy="0"/>
+          <a:chOff x="0" y="0"/>
+          <a:chExt cx="0" cy="0"/>
+        </a:xfrm>
+      </p:grpSpPr>
+      <p:sp>
+        <p:nvSpPr>
+          <p:cNvPr id="2" name="제목 1">
+            <a:extLst>
+              <a:ext uri="{FF2B5EF4-FFF2-40B4-BE49-F238E27FC236}">
+                <a16:creationId xmlns:a16="http://schemas.microsoft.com/office/drawing/2014/main" id="{6EDBD7DB-532B-469C-A0E8-976836A1917D}"/>
+              </a:ext>
+            </a:extLst>
+          </p:cNvPr>
+          <p:cNvSpPr>
+            <a:spLocks noGrp="1"/>
+          </p:cNvSpPr>
+          <p:nvPr>
+            <p:ph type="title"/>
+          </p:nvPr>
+        </p:nvSpPr>
+        <p:spPr/>
+        <p:txBody>
+          <a:bodyPr/>
+          <a:lstStyle/>
+          <a:p>
+            <a:r>
+              <a:rPr lang="ko-KR" altLang="en-US" dirty="0"/>
+              <a:t>결과</a:t>
+            </a:r>
+          </a:p>
+        </p:txBody>
+      </p:sp>
+      <p:sp>
+        <p:nvSpPr>
+          <p:cNvPr id="3" name="내용 개체 틀 2">
+            <a:extLst>
+              <a:ext uri="{FF2B5EF4-FFF2-40B4-BE49-F238E27FC236}">
+                <a16:creationId xmlns:a16="http://schemas.microsoft.com/office/drawing/2014/main" id="{8923F8D0-CFE9-4B9E-B512-49DBA9D38FF0}"/>
+              </a:ext>
+            </a:extLst>
+          </p:cNvPr>
+          <p:cNvSpPr>
+            <a:spLocks noGrp="1"/>
+          </p:cNvSpPr>
+          <p:nvPr>
+            <p:ph idx="1"/>
+          </p:nvPr>
+        </p:nvSpPr>
+        <p:spPr/>
+        <p:txBody>
+          <a:bodyPr/>
+          <a:lstStyle/>
+          <a:p>
+            <a:r>
+              <a:rPr lang="ko-KR" altLang="en-US" dirty="0"/>
+              <a:t>시연</a:t>
+            </a:r>
+          </a:p>
+        </p:txBody>
+      </p:sp>
+    </p:spTree>
+    <p:extLst>
+      <p:ext uri="{BB962C8B-B14F-4D97-AF65-F5344CB8AC3E}">
+        <p14:creationId xmlns:p14="http://schemas.microsoft.com/office/powerpoint/2010/main" val="3178876926"/>
       </p:ext>
     </p:extLst>
   </p:cSld>

</xml_diff>